<commit_message>
updated presentation for talk at DNUG Ulm
</commit_message>
<xml_diff>
--- a/NET Threading im Detail.pptx
+++ b/NET Threading im Detail.pptx
@@ -261,7 +261,7 @@
           <a:p>
             <a:fld id="{31329841-37CA-41DE-9E66-2E01450F3727}" type="datetimeFigureOut">
               <a:rPr lang="en-US" smtClean="0"/>
-              <a:t>1/30/2017</a:t>
+              <a:t>3/15/2017</a:t>
             </a:fld>
             <a:endParaRPr lang="en-US"/>
           </a:p>
@@ -657,7 +657,7 @@
           <a:p>
             <a:r>
               <a:rPr lang="en-US"/>
-              <a:t>30.01.2017</a:t>
+              <a:t>15.03.2017</a:t>
             </a:r>
           </a:p>
         </p:txBody>
@@ -830,7 +830,7 @@
           <a:p>
             <a:r>
               <a:rPr lang="en-US"/>
-              <a:t>30.01.2017</a:t>
+              <a:t>15.03.2017</a:t>
             </a:r>
           </a:p>
         </p:txBody>
@@ -1080,7 +1080,7 @@
           <a:p>
             <a:r>
               <a:rPr lang="en-US"/>
-              <a:t>30.01.2017</a:t>
+              <a:t>15.03.2017</a:t>
             </a:r>
           </a:p>
         </p:txBody>
@@ -1321,7 +1321,7 @@
           <a:p>
             <a:r>
               <a:rPr lang="en-US"/>
-              <a:t>30.01.2017</a:t>
+              <a:t>15.03.2017</a:t>
             </a:r>
           </a:p>
         </p:txBody>
@@ -1697,7 +1697,7 @@
           <a:p>
             <a:r>
               <a:rPr lang="en-US"/>
-              <a:t>30.01.2017</a:t>
+              <a:t>15.03.2017</a:t>
             </a:r>
           </a:p>
         </p:txBody>
@@ -1826,7 +1826,7 @@
           <a:p>
             <a:r>
               <a:rPr lang="en-US"/>
-              <a:t>30.01.2017</a:t>
+              <a:t>15.03.2017</a:t>
             </a:r>
           </a:p>
         </p:txBody>
@@ -1926,7 +1926,7 @@
           <a:p>
             <a:r>
               <a:rPr lang="en-US"/>
-              <a:t>30.01.2017</a:t>
+              <a:t>15.03.2017</a:t>
             </a:r>
           </a:p>
         </p:txBody>
@@ -2209,7 +2209,7 @@
           <a:p>
             <a:r>
               <a:rPr lang="en-US"/>
-              <a:t>30.01.2017</a:t>
+              <a:t>15.03.2017</a:t>
             </a:r>
           </a:p>
         </p:txBody>
@@ -2469,7 +2469,7 @@
           <a:p>
             <a:r>
               <a:rPr lang="en-US"/>
-              <a:t>30.01.2017</a:t>
+              <a:t>15.03.2017</a:t>
             </a:r>
           </a:p>
         </p:txBody>
@@ -2685,7 +2685,7 @@
           <a:p>
             <a:r>
               <a:rPr lang="en-US"/>
-              <a:t>30.01.2017</a:t>
+              <a:t>15.03.2017</a:t>
             </a:r>
           </a:p>
         </p:txBody>
@@ -3673,23 +3673,23 @@
           <a:p>
             <a:r>
               <a:rPr lang="de-DE" dirty="0"/>
-              <a:t>.NET User Group Regensburg</a:t>
+              <a:t>.NET Developer Group Ulm</a:t>
             </a:r>
           </a:p>
           <a:p>
             <a:r>
               <a:rPr lang="de-DE" dirty="0"/>
-              <a:t>30.01.2017</a:t>
+              <a:t>15.03.2017</a:t>
             </a:r>
           </a:p>
           <a:p>
             <a:r>
               <a:rPr lang="de-DE" dirty="0" err="1"/>
-              <a:t>Techbase</a:t>
+              <a:t>Artiso</a:t>
             </a:r>
             <a:r>
               <a:rPr lang="de-DE" dirty="0"/>
-              <a:t> Regensburg</a:t>
+              <a:t> Solutions GmbH</a:t>
             </a:r>
             <a:endParaRPr lang="en-US" dirty="0"/>
           </a:p>
@@ -3712,7 +3712,7 @@
           <a:p>
             <a:r>
               <a:rPr lang="en-US"/>
-              <a:t>30.01.2017</a:t>
+              <a:t>15.03.2017</a:t>
             </a:r>
           </a:p>
         </p:txBody>
@@ -3919,7 +3919,7 @@
           <a:p>
             <a:r>
               <a:rPr lang="en-US"/>
-              <a:t>30.01.2017</a:t>
+              <a:t>15.03.2017</a:t>
             </a:r>
           </a:p>
         </p:txBody>
@@ -4327,7 +4327,7 @@
           <a:p>
             <a:r>
               <a:rPr lang="en-US"/>
-              <a:t>30.01.2017</a:t>
+              <a:t>15.03.2017</a:t>
             </a:r>
           </a:p>
         </p:txBody>
@@ -4743,7 +4743,7 @@
           <a:p>
             <a:r>
               <a:rPr lang="en-US"/>
-              <a:t>30.01.2017</a:t>
+              <a:t>15.03.2017</a:t>
             </a:r>
           </a:p>
         </p:txBody>
@@ -4893,7 +4893,7 @@
           <a:p>
             <a:r>
               <a:rPr lang="en-US"/>
-              <a:t>30.01.2017</a:t>
+              <a:t>15.03.2017</a:t>
             </a:r>
           </a:p>
         </p:txBody>
@@ -5015,7 +5015,7 @@
           <a:p>
             <a:r>
               <a:rPr lang="en-US"/>
-              <a:t>30.01.2017</a:t>
+              <a:t>15.03.2017</a:t>
             </a:r>
           </a:p>
         </p:txBody>
@@ -5300,7 +5300,7 @@
           <a:p>
             <a:r>
               <a:rPr lang="en-US"/>
-              <a:t>30.01.2017</a:t>
+              <a:t>15.03.2017</a:t>
             </a:r>
           </a:p>
         </p:txBody>
@@ -5645,7 +5645,7 @@
           <a:p>
             <a:r>
               <a:rPr lang="en-US"/>
-              <a:t>30.01.2017</a:t>
+              <a:t>15.03.2017</a:t>
             </a:r>
           </a:p>
         </p:txBody>
@@ -6026,7 +6026,7 @@
           <a:p>
             <a:r>
               <a:rPr lang="en-US"/>
-              <a:t>30.01.2017</a:t>
+              <a:t>15.03.2017</a:t>
             </a:r>
           </a:p>
         </p:txBody>
@@ -6444,7 +6444,7 @@
           <a:p>
             <a:r>
               <a:rPr lang="en-US"/>
-              <a:t>30.01.2017</a:t>
+              <a:t>15.03.2017</a:t>
             </a:r>
           </a:p>
         </p:txBody>
@@ -6947,7 +6947,7 @@
           <a:p>
             <a:r>
               <a:rPr lang="en-US"/>
-              <a:t>30.01.2017</a:t>
+              <a:t>15.03.2017</a:t>
             </a:r>
           </a:p>
         </p:txBody>
@@ -7421,7 +7421,7 @@
           <a:p>
             <a:r>
               <a:rPr lang="en-US"/>
-              <a:t>30.01.2017</a:t>
+              <a:t>15.03.2017</a:t>
             </a:r>
           </a:p>
         </p:txBody>
@@ -7543,7 +7543,7 @@
           <a:p>
             <a:r>
               <a:rPr lang="en-US"/>
-              <a:t>30.01.2017</a:t>
+              <a:t>15.03.2017</a:t>
             </a:r>
           </a:p>
         </p:txBody>
@@ -7924,7 +7924,7 @@
           <a:p>
             <a:r>
               <a:rPr lang="en-US"/>
-              <a:t>30.01.2017</a:t>
+              <a:t>15.03.2017</a:t>
             </a:r>
           </a:p>
         </p:txBody>
@@ -8269,7 +8269,7 @@
           <a:p>
             <a:r>
               <a:rPr lang="en-US"/>
-              <a:t>30.01.2017</a:t>
+              <a:t>15.03.2017</a:t>
             </a:r>
           </a:p>
         </p:txBody>
@@ -8764,7 +8764,7 @@
           <a:p>
             <a:r>
               <a:rPr lang="en-US"/>
-              <a:t>30.01.2017</a:t>
+              <a:t>15.03.2017</a:t>
             </a:r>
           </a:p>
         </p:txBody>
@@ -9224,7 +9224,7 @@
           <a:p>
             <a:r>
               <a:rPr lang="en-US"/>
-              <a:t>30.01.2017</a:t>
+              <a:t>15.03.2017</a:t>
             </a:r>
           </a:p>
         </p:txBody>
@@ -9651,7 +9651,7 @@
           <a:p>
             <a:r>
               <a:rPr lang="en-US"/>
-              <a:t>30.01.2017</a:t>
+              <a:t>15.03.2017</a:t>
             </a:r>
           </a:p>
         </p:txBody>
@@ -10058,7 +10058,7 @@
           <a:p>
             <a:r>
               <a:rPr lang="en-US"/>
-              <a:t>30.01.2017</a:t>
+              <a:t>15.03.2017</a:t>
             </a:r>
           </a:p>
         </p:txBody>
@@ -10577,7 +10577,7 @@
           <a:p>
             <a:r>
               <a:rPr lang="en-US"/>
-              <a:t>30.01.2017</a:t>
+              <a:t>15.03.2017</a:t>
             </a:r>
           </a:p>
         </p:txBody>
@@ -10718,7 +10718,7 @@
           <a:p>
             <a:r>
               <a:rPr lang="en-US"/>
-              <a:t>30.01.2017</a:t>
+              <a:t>15.03.2017</a:t>
             </a:r>
           </a:p>
         </p:txBody>
@@ -10888,7 +10888,7 @@
           <a:p>
             <a:r>
               <a:rPr lang="en-US"/>
-              <a:t>30.01.2017</a:t>
+              <a:t>15.03.2017</a:t>
             </a:r>
           </a:p>
         </p:txBody>
@@ -11007,7 +11007,7 @@
         <p:spPr/>
         <p:txBody>
           <a:bodyPr>
-            <a:normAutofit fontScale="92500" lnSpcReduction="20000"/>
+            <a:normAutofit fontScale="92500" lnSpcReduction="10000"/>
           </a:bodyPr>
           <a:lstStyle/>
           <a:p>
@@ -11019,7 +11019,7 @@
           <a:p>
             <a:r>
               <a:rPr lang="de-DE" dirty="0"/>
-              <a:t>Wissenschaftlicher Mitarbeiter am Universitätsklinikum Regensburg</a:t>
+              <a:t>Wissenschaftlicher Mitarbeiter an der OTH Regensburg</a:t>
             </a:r>
           </a:p>
           <a:p>
@@ -11127,7 +11127,7 @@
           <a:p>
             <a:r>
               <a:rPr lang="en-US"/>
-              <a:t>30.01.2017</a:t>
+              <a:t>15.03.2017</a:t>
             </a:r>
           </a:p>
         </p:txBody>
@@ -11680,7 +11680,7 @@
           <a:p>
             <a:r>
               <a:rPr lang="en-US"/>
-              <a:t>30.01.2017</a:t>
+              <a:t>15.03.2017</a:t>
             </a:r>
           </a:p>
         </p:txBody>
@@ -11869,7 +11869,7 @@
           <a:p>
             <a:r>
               <a:rPr lang="en-US"/>
-              <a:t>30.01.2017</a:t>
+              <a:t>15.03.2017</a:t>
             </a:r>
           </a:p>
         </p:txBody>
@@ -12463,7 +12463,7 @@
           <a:p>
             <a:r>
               <a:rPr lang="en-US"/>
-              <a:t>30.01.2017</a:t>
+              <a:t>15.03.2017</a:t>
             </a:r>
           </a:p>
         </p:txBody>
@@ -12613,7 +12613,7 @@
           <a:p>
             <a:r>
               <a:rPr lang="en-US"/>
-              <a:t>30.01.2017</a:t>
+              <a:t>15.03.2017</a:t>
             </a:r>
           </a:p>
         </p:txBody>
@@ -12747,7 +12747,7 @@
           <a:p>
             <a:r>
               <a:rPr lang="en-US"/>
-              <a:t>30.01.2017</a:t>
+              <a:t>15.03.2017</a:t>
             </a:r>
           </a:p>
         </p:txBody>
@@ -12924,7 +12924,7 @@
           <a:p>
             <a:r>
               <a:rPr lang="en-US"/>
-              <a:t>30.01.2017</a:t>
+              <a:t>15.03.2017</a:t>
             </a:r>
           </a:p>
         </p:txBody>
@@ -13349,7 +13349,7 @@
           <a:p>
             <a:r>
               <a:rPr lang="en-US"/>
-              <a:t>30.01.2017</a:t>
+              <a:t>15.03.2017</a:t>
             </a:r>
           </a:p>
         </p:txBody>
@@ -13920,7 +13920,7 @@
           <a:p>
             <a:r>
               <a:rPr lang="en-US"/>
-              <a:t>30.01.2017</a:t>
+              <a:t>15.03.2017</a:t>
             </a:r>
           </a:p>
         </p:txBody>
@@ -14835,7 +14835,7 @@
           <a:p>
             <a:r>
               <a:rPr lang="en-US"/>
-              <a:t>30.01.2017</a:t>
+              <a:t>15.03.2017</a:t>
             </a:r>
           </a:p>
         </p:txBody>
@@ -15780,7 +15780,7 @@
           <a:p>
             <a:r>
               <a:rPr lang="en-US"/>
-              <a:t>30.01.2017</a:t>
+              <a:t>15.03.2017</a:t>
             </a:r>
           </a:p>
         </p:txBody>
@@ -16728,7 +16728,7 @@
           <a:p>
             <a:r>
               <a:rPr lang="en-US"/>
-              <a:t>30.01.2017</a:t>
+              <a:t>15.03.2017</a:t>
             </a:r>
           </a:p>
         </p:txBody>
@@ -16907,7 +16907,7 @@
           <a:p>
             <a:r>
               <a:rPr lang="en-US"/>
-              <a:t>30.01.2017</a:t>
+              <a:t>15.03.2017</a:t>
             </a:r>
           </a:p>
         </p:txBody>
@@ -17232,7 +17232,7 @@
           <a:p>
             <a:r>
               <a:rPr lang="en-US"/>
-              <a:t>30.01.2017</a:t>
+              <a:t>15.03.2017</a:t>
             </a:r>
           </a:p>
         </p:txBody>
@@ -17764,7 +17764,7 @@
           <a:p>
             <a:r>
               <a:rPr lang="en-US"/>
-              <a:t>30.01.2017</a:t>
+              <a:t>15.03.2017</a:t>
             </a:r>
           </a:p>
         </p:txBody>
@@ -18621,7 +18621,7 @@
           <a:p>
             <a:r>
               <a:rPr lang="en-US"/>
-              <a:t>30.01.2017</a:t>
+              <a:t>15.03.2017</a:t>
             </a:r>
           </a:p>
         </p:txBody>
@@ -19495,7 +19495,7 @@
           <a:p>
             <a:r>
               <a:rPr lang="en-US"/>
-              <a:t>30.01.2017</a:t>
+              <a:t>15.03.2017</a:t>
             </a:r>
           </a:p>
         </p:txBody>
@@ -20008,7 +20008,7 @@
           <a:p>
             <a:r>
               <a:rPr lang="en-US"/>
-              <a:t>30.01.2017</a:t>
+              <a:t>15.03.2017</a:t>
             </a:r>
           </a:p>
         </p:txBody>
@@ -20152,7 +20152,7 @@
           <a:p>
             <a:r>
               <a:rPr lang="en-US"/>
-              <a:t>30.01.2017</a:t>
+              <a:t>15.03.2017</a:t>
             </a:r>
           </a:p>
         </p:txBody>
@@ -20270,7 +20270,7 @@
         <p:spPr/>
         <p:txBody>
           <a:bodyPr>
-            <a:normAutofit fontScale="92500" lnSpcReduction="10000"/>
+            <a:normAutofit fontScale="92500" lnSpcReduction="20000"/>
           </a:bodyPr>
           <a:lstStyle/>
           <a:p>
@@ -20372,7 +20372,15 @@
             </a:r>
             <a:r>
               <a:rPr lang="de-DE" dirty="0"/>
-              <a:t> – d.h. dass ein Write gefolgt von einem Read vertauscht werden dürfen</a:t>
+              <a:t> – d.h. dass eine Write Operation gefolgt von einem Read </a:t>
+            </a:r>
+            <a:r>
+              <a:rPr lang="de-DE" dirty="0" err="1"/>
+              <a:t>Opertion</a:t>
+            </a:r>
+            <a:r>
+              <a:rPr lang="de-DE" dirty="0"/>
+              <a:t> vertauscht werden darf</a:t>
             </a:r>
           </a:p>
           <a:p>
@@ -20456,7 +20464,7 @@
           <a:p>
             <a:r>
               <a:rPr lang="en-US"/>
-              <a:t>30.01.2017</a:t>
+              <a:t>15.03.2017</a:t>
             </a:r>
           </a:p>
         </p:txBody>
@@ -20967,7 +20975,7 @@
           <a:p>
             <a:r>
               <a:rPr lang="en-US"/>
-              <a:t>30.01.2017</a:t>
+              <a:t>15.03.2017</a:t>
             </a:r>
           </a:p>
         </p:txBody>
@@ -21449,7 +21457,7 @@
           <a:p>
             <a:r>
               <a:rPr lang="en-US"/>
-              <a:t>30.01.2017</a:t>
+              <a:t>15.03.2017</a:t>
             </a:r>
           </a:p>
         </p:txBody>
@@ -21615,7 +21623,7 @@
           <a:p>
             <a:r>
               <a:rPr lang="en-US"/>
-              <a:t>30.01.2017</a:t>
+              <a:t>15.03.2017</a:t>
             </a:r>
           </a:p>
         </p:txBody>
@@ -22013,7 +22021,7 @@
           <a:p>
             <a:r>
               <a:rPr lang="en-US"/>
-              <a:t>30.01.2017</a:t>
+              <a:t>15.03.2017</a:t>
             </a:r>
           </a:p>
         </p:txBody>
@@ -22143,7 +22151,7 @@
           <a:p>
             <a:r>
               <a:rPr lang="en-US"/>
-              <a:t>30.01.2017</a:t>
+              <a:t>15.03.2017</a:t>
             </a:r>
           </a:p>
         </p:txBody>
@@ -23021,7 +23029,7 @@
           <a:p>
             <a:r>
               <a:rPr lang="en-US"/>
-              <a:t>30.01.2017</a:t>
+              <a:t>15.03.2017</a:t>
             </a:r>
           </a:p>
         </p:txBody>
@@ -23937,7 +23945,7 @@
           <a:p>
             <a:r>
               <a:rPr lang="en-US"/>
-              <a:t>30.01.2017</a:t>
+              <a:t>15.03.2017</a:t>
             </a:r>
           </a:p>
         </p:txBody>
@@ -24889,7 +24897,7 @@
           <a:p>
             <a:r>
               <a:rPr lang="en-US"/>
-              <a:t>30.01.2017</a:t>
+              <a:t>15.03.2017</a:t>
             </a:r>
           </a:p>
         </p:txBody>
@@ -25884,7 +25892,7 @@
           <a:p>
             <a:r>
               <a:rPr lang="en-US"/>
-              <a:t>30.01.2017</a:t>
+              <a:t>15.03.2017</a:t>
             </a:r>
           </a:p>
         </p:txBody>
@@ -26932,7 +26940,7 @@
           <a:p>
             <a:r>
               <a:rPr lang="en-US"/>
-              <a:t>30.01.2017</a:t>
+              <a:t>15.03.2017</a:t>
             </a:r>
           </a:p>
         </p:txBody>
@@ -27981,7 +27989,7 @@
           <a:p>
             <a:r>
               <a:rPr lang="en-US"/>
-              <a:t>30.01.2017</a:t>
+              <a:t>15.03.2017</a:t>
             </a:r>
           </a:p>
         </p:txBody>
@@ -29030,7 +29038,7 @@
           <a:p>
             <a:r>
               <a:rPr lang="en-US"/>
-              <a:t>30.01.2017</a:t>
+              <a:t>15.03.2017</a:t>
             </a:r>
           </a:p>
         </p:txBody>
@@ -30023,7 +30031,7 @@
           <a:p>
             <a:r>
               <a:rPr lang="en-US"/>
-              <a:t>30.01.2017</a:t>
+              <a:t>15.03.2017</a:t>
             </a:r>
           </a:p>
         </p:txBody>
@@ -31190,7 +31198,7 @@
           <a:p>
             <a:r>
               <a:rPr lang="en-US"/>
-              <a:t>30.01.2017</a:t>
+              <a:t>15.03.2017</a:t>
             </a:r>
           </a:p>
         </p:txBody>
@@ -31320,7 +31328,7 @@
           <a:p>
             <a:r>
               <a:rPr lang="en-US"/>
-              <a:t>30.01.2017</a:t>
+              <a:t>15.03.2017</a:t>
             </a:r>
           </a:p>
         </p:txBody>
@@ -32434,7 +32442,7 @@
           <a:p>
             <a:r>
               <a:rPr lang="en-US"/>
-              <a:t>30.01.2017</a:t>
+              <a:t>15.03.2017</a:t>
             </a:r>
           </a:p>
         </p:txBody>
@@ -32622,7 +32630,7 @@
           <a:p>
             <a:r>
               <a:rPr lang="en-US"/>
-              <a:t>30.01.2017</a:t>
+              <a:t>15.03.2017</a:t>
             </a:r>
           </a:p>
         </p:txBody>
@@ -32855,7 +32863,7 @@
           <a:p>
             <a:r>
               <a:rPr lang="en-US"/>
-              <a:t>30.01.2017</a:t>
+              <a:t>15.03.2017</a:t>
             </a:r>
           </a:p>
         </p:txBody>
@@ -33138,7 +33146,7 @@
           <a:p>
             <a:r>
               <a:rPr lang="en-US"/>
-              <a:t>30.01.2017</a:t>
+              <a:t>15.03.2017</a:t>
             </a:r>
           </a:p>
         </p:txBody>
@@ -33288,7 +33296,7 @@
           <a:p>
             <a:r>
               <a:rPr lang="en-US"/>
-              <a:t>30.01.2017</a:t>
+              <a:t>15.03.2017</a:t>
             </a:r>
           </a:p>
         </p:txBody>
@@ -33434,7 +33442,7 @@
           <a:p>
             <a:r>
               <a:rPr lang="en-US"/>
-              <a:t>30.01.2017</a:t>
+              <a:t>15.03.2017</a:t>
             </a:r>
           </a:p>
         </p:txBody>
@@ -33606,7 +33614,7 @@
           <a:p>
             <a:r>
               <a:rPr lang="en-US"/>
-              <a:t>30.01.2017</a:t>
+              <a:t>15.03.2017</a:t>
             </a:r>
           </a:p>
         </p:txBody>
@@ -33748,7 +33756,7 @@
           <a:p>
             <a:r>
               <a:rPr lang="en-US"/>
-              <a:t>30.01.2017</a:t>
+              <a:t>15.03.2017</a:t>
             </a:r>
           </a:p>
         </p:txBody>

</xml_diff>

<commit_message>
updated about-me section in presentation
</commit_message>
<xml_diff>
--- a/NET Threading im Detail.pptx
+++ b/NET Threading im Detail.pptx
@@ -11007,7 +11007,7 @@
         <p:spPr/>
         <p:txBody>
           <a:bodyPr>
-            <a:normAutofit fontScale="92500" lnSpcReduction="10000"/>
+            <a:normAutofit fontScale="85000" lnSpcReduction="10000"/>
           </a:bodyPr>
           <a:lstStyle/>
           <a:p>
@@ -11026,6 +11026,12 @@
             <a:r>
               <a:rPr lang="de-DE" dirty="0"/>
               <a:t>Softwareentwickler bei virtNET</a:t>
+            </a:r>
+          </a:p>
+          <a:p>
+            <a:r>
+              <a:rPr lang="de-DE" dirty="0"/>
+              <a:t>Organisator der DNUG Regensburg</a:t>
             </a:r>
           </a:p>
           <a:p>
@@ -11409,7 +11415,7 @@
                                         <p:tgtEl>
                                           <p:spTgt spid="5">
                                             <p:txEl>
-                                              <p:pRg st="4" end="4"/>
+                                              <p:pRg st="3" end="3"/>
                                             </p:txEl>
                                           </p:spTgt>
                                         </p:tgtEl>
@@ -11427,7 +11433,7 @@
                                         <p:tgtEl>
                                           <p:spTgt spid="5">
                                             <p:txEl>
-                                              <p:pRg st="4" end="4"/>
+                                              <p:pRg st="3" end="3"/>
                                             </p:txEl>
                                           </p:spTgt>
                                         </p:tgtEl>
@@ -11550,6 +11556,67 @@
                                           <p:spTgt spid="5">
                                             <p:txEl>
                                               <p:pRg st="6" end="6"/>
+                                            </p:txEl>
+                                          </p:spTgt>
+                                        </p:tgtEl>
+                                      </p:cBhvr>
+                                    </p:animEffect>
+                                  </p:childTnLst>
+                                </p:cTn>
+                              </p:par>
+                            </p:childTnLst>
+                          </p:cTn>
+                        </p:par>
+                      </p:childTnLst>
+                    </p:cTn>
+                  </p:par>
+                  <p:par>
+                    <p:cTn id="33" fill="hold">
+                      <p:stCondLst>
+                        <p:cond delay="indefinite"/>
+                      </p:stCondLst>
+                      <p:childTnLst>
+                        <p:par>
+                          <p:cTn id="34" fill="hold">
+                            <p:stCondLst>
+                              <p:cond delay="0"/>
+                            </p:stCondLst>
+                            <p:childTnLst>
+                              <p:par>
+                                <p:cTn id="35" presetID="10" presetClass="entr" presetSubtype="0" fill="hold" grpId="0" nodeType="clickEffect">
+                                  <p:stCondLst>
+                                    <p:cond delay="0"/>
+                                  </p:stCondLst>
+                                  <p:childTnLst>
+                                    <p:set>
+                                      <p:cBhvr>
+                                        <p:cTn id="36" dur="1" fill="hold">
+                                          <p:stCondLst>
+                                            <p:cond delay="0"/>
+                                          </p:stCondLst>
+                                        </p:cTn>
+                                        <p:tgtEl>
+                                          <p:spTgt spid="5">
+                                            <p:txEl>
+                                              <p:pRg st="7" end="7"/>
+                                            </p:txEl>
+                                          </p:spTgt>
+                                        </p:tgtEl>
+                                        <p:attrNameLst>
+                                          <p:attrName>style.visibility</p:attrName>
+                                        </p:attrNameLst>
+                                      </p:cBhvr>
+                                      <p:to>
+                                        <p:strVal val="visible"/>
+                                      </p:to>
+                                    </p:set>
+                                    <p:animEffect transition="in" filter="fade">
+                                      <p:cBhvr>
+                                        <p:cTn id="37" dur="500"/>
+                                        <p:tgtEl>
+                                          <p:spTgt spid="5">
+                                            <p:txEl>
+                                              <p:pRg st="7" end="7"/>
                                             </p:txEl>
                                           </p:spTgt>
                                         </p:tgtEl>

</xml_diff>

<commit_message>
added performance charts to presentation
</commit_message>
<xml_diff>
--- a/NET Threading im Detail.pptx
+++ b/NET Threading im Detail.pptx
@@ -5,7 +5,7 @@
     <p:sldMasterId id="2147483648" r:id="rId1"/>
   </p:sldMasterIdLst>
   <p:notesMasterIdLst>
-    <p:notesMasterId r:id="rId67"/>
+    <p:notesMasterId r:id="rId69"/>
   </p:notesMasterIdLst>
   <p:sldIdLst>
     <p:sldId id="256" r:id="rId2"/>
@@ -69,10 +69,12 @@
     <p:sldId id="320" r:id="rId60"/>
     <p:sldId id="319" r:id="rId61"/>
     <p:sldId id="322" r:id="rId62"/>
-    <p:sldId id="323" r:id="rId63"/>
-    <p:sldId id="324" r:id="rId64"/>
-    <p:sldId id="332" r:id="rId65"/>
-    <p:sldId id="331" r:id="rId66"/>
+    <p:sldId id="333" r:id="rId63"/>
+    <p:sldId id="334" r:id="rId64"/>
+    <p:sldId id="323" r:id="rId65"/>
+    <p:sldId id="324" r:id="rId66"/>
+    <p:sldId id="332" r:id="rId67"/>
+    <p:sldId id="331" r:id="rId68"/>
   </p:sldIdLst>
   <p:sldSz cx="12192000" cy="6858000"/>
   <p:notesSz cx="6858000" cy="9144000"/>
@@ -177,6 +179,2366 @@
     </p:ext>
   </p:extLst>
 </p:presentation>
+</file>
+
+<file path=ppt/charts/chart1.xml><?xml version="1.0" encoding="utf-8"?>
+<c:chartSpace xmlns:c="http://schemas.openxmlformats.org/drawingml/2006/chart" xmlns:a="http://schemas.openxmlformats.org/drawingml/2006/main" xmlns:r="http://schemas.openxmlformats.org/officeDocument/2006/relationships" xmlns:c16r2="http://schemas.microsoft.com/office/drawing/2015/06/chart">
+  <c:date1904 val="0"/>
+  <c:lang val="en-US"/>
+  <c:roundedCorners val="0"/>
+  <mc:AlternateContent xmlns:mc="http://schemas.openxmlformats.org/markup-compatibility/2006">
+    <mc:Choice xmlns:c14="http://schemas.microsoft.com/office/drawing/2007/8/2/chart" Requires="c14">
+      <c14:style val="102"/>
+    </mc:Choice>
+    <mc:Fallback>
+      <c:style val="2"/>
+    </mc:Fallback>
+  </mc:AlternateContent>
+  <c:chart>
+    <c:title>
+      <c:tx>
+        <c:rich>
+          <a:bodyPr rot="0" spcFirstLastPara="1" vertOverflow="ellipsis" vert="horz" wrap="square" anchor="ctr" anchorCtr="1"/>
+          <a:lstStyle/>
+          <a:p>
+            <a:pPr>
+              <a:defRPr sz="1862" b="0" i="0" u="none" strike="noStrike" kern="1200" spc="0" baseline="0">
+                <a:solidFill>
+                  <a:schemeClr val="tx1">
+                    <a:lumMod val="65000"/>
+                    <a:lumOff val="35000"/>
+                  </a:schemeClr>
+                </a:solidFill>
+                <a:latin typeface="+mn-lt"/>
+                <a:ea typeface="+mn-ea"/>
+                <a:cs typeface="+mn-cs"/>
+              </a:defRPr>
+            </a:pPr>
+            <a:r>
+              <a:rPr lang="en-US" sz="1600" noProof="0" dirty="0"/>
+              <a:t>Concurrent Read from with</a:t>
+            </a:r>
+            <a:r>
+              <a:rPr lang="en-US" sz="1600" baseline="0" noProof="0" dirty="0"/>
+              <a:t> 8 Threads, in microseconds, 5% of keys not present in dictionary</a:t>
+            </a:r>
+            <a:endParaRPr lang="en-US" sz="1600" noProof="0" dirty="0"/>
+          </a:p>
+        </c:rich>
+      </c:tx>
+      <c:overlay val="0"/>
+      <c:spPr>
+        <a:noFill/>
+        <a:ln>
+          <a:noFill/>
+        </a:ln>
+        <a:effectLst/>
+      </c:spPr>
+      <c:txPr>
+        <a:bodyPr rot="0" spcFirstLastPara="1" vertOverflow="ellipsis" vert="horz" wrap="square" anchor="ctr" anchorCtr="1"/>
+        <a:lstStyle/>
+        <a:p>
+          <a:pPr>
+            <a:defRPr sz="1862" b="0" i="0" u="none" strike="noStrike" kern="1200" spc="0" baseline="0">
+              <a:solidFill>
+                <a:schemeClr val="tx1">
+                  <a:lumMod val="65000"/>
+                  <a:lumOff val="35000"/>
+                </a:schemeClr>
+              </a:solidFill>
+              <a:latin typeface="+mn-lt"/>
+              <a:ea typeface="+mn-ea"/>
+              <a:cs typeface="+mn-cs"/>
+            </a:defRPr>
+          </a:pPr>
+          <a:endParaRPr lang="de-DE"/>
+        </a:p>
+      </c:txPr>
+    </c:title>
+    <c:autoTitleDeleted val="0"/>
+    <c:plotArea>
+      <c:layout/>
+      <c:barChart>
+        <c:barDir val="col"/>
+        <c:grouping val="clustered"/>
+        <c:varyColors val="0"/>
+        <c:ser>
+          <c:idx val="0"/>
+          <c:order val="0"/>
+          <c:tx>
+            <c:strRef>
+              <c:f>Sheet1!$B$1</c:f>
+              <c:strCache>
+                <c:ptCount val="1"/>
+                <c:pt idx="0">
+                  <c:v>Dictionary with lock</c:v>
+                </c:pt>
+              </c:strCache>
+            </c:strRef>
+          </c:tx>
+          <c:spPr>
+            <a:solidFill>
+              <a:schemeClr val="accent1"/>
+            </a:solidFill>
+            <a:ln>
+              <a:noFill/>
+            </a:ln>
+            <a:effectLst/>
+          </c:spPr>
+          <c:invertIfNegative val="0"/>
+          <c:dLbls>
+            <c:spPr>
+              <a:noFill/>
+              <a:ln>
+                <a:noFill/>
+              </a:ln>
+              <a:effectLst/>
+            </c:spPr>
+            <c:txPr>
+              <a:bodyPr rot="0" spcFirstLastPara="1" vertOverflow="ellipsis" vert="horz" wrap="square" lIns="38100" tIns="19050" rIns="38100" bIns="19050" anchor="ctr" anchorCtr="1">
+                <a:spAutoFit/>
+              </a:bodyPr>
+              <a:lstStyle/>
+              <a:p>
+                <a:pPr>
+                  <a:defRPr sz="1197" b="0" i="0" u="none" strike="noStrike" kern="1200" baseline="0">
+                    <a:solidFill>
+                      <a:schemeClr val="tx1">
+                        <a:lumMod val="75000"/>
+                        <a:lumOff val="25000"/>
+                      </a:schemeClr>
+                    </a:solidFill>
+                    <a:latin typeface="+mn-lt"/>
+                    <a:ea typeface="+mn-ea"/>
+                    <a:cs typeface="+mn-cs"/>
+                  </a:defRPr>
+                </a:pPr>
+                <a:endParaRPr lang="de-DE"/>
+              </a:p>
+            </c:txPr>
+            <c:dLblPos val="outEnd"/>
+            <c:showLegendKey val="0"/>
+            <c:showVal val="1"/>
+            <c:showCatName val="0"/>
+            <c:showSerName val="0"/>
+            <c:showPercent val="0"/>
+            <c:showBubbleSize val="0"/>
+            <c:showLeaderLines val="0"/>
+            <c:extLst>
+              <c:ext xmlns:c15="http://schemas.microsoft.com/office/drawing/2012/chart" uri="{CE6537A1-D6FC-4f65-9D91-7224C49458BB}">
+                <c15:showLeaderLines val="1"/>
+                <c15:leaderLines>
+                  <c:spPr>
+                    <a:ln w="9525" cap="flat" cmpd="sng" algn="ctr">
+                      <a:solidFill>
+                        <a:schemeClr val="tx1">
+                          <a:lumMod val="35000"/>
+                          <a:lumOff val="65000"/>
+                        </a:schemeClr>
+                      </a:solidFill>
+                      <a:round/>
+                    </a:ln>
+                    <a:effectLst/>
+                  </c:spPr>
+                </c15:leaderLines>
+              </c:ext>
+            </c:extLst>
+          </c:dLbls>
+          <c:cat>
+            <c:strRef>
+              <c:f>Sheet1!$A$2:$A$4</c:f>
+              <c:strCache>
+                <c:ptCount val="3"/>
+                <c:pt idx="0">
+                  <c:v>10.000 items</c:v>
+                </c:pt>
+                <c:pt idx="1">
+                  <c:v>100.000 items</c:v>
+                </c:pt>
+                <c:pt idx="2">
+                  <c:v>500.000 items</c:v>
+                </c:pt>
+              </c:strCache>
+            </c:strRef>
+          </c:cat>
+          <c:val>
+            <c:numRef>
+              <c:f>Sheet1!$B$2:$B$4</c:f>
+              <c:numCache>
+                <c:formatCode>0</c:formatCode>
+                <c:ptCount val="3"/>
+                <c:pt idx="0">
+                  <c:v>1637</c:v>
+                </c:pt>
+                <c:pt idx="1">
+                  <c:v>8134</c:v>
+                </c:pt>
+                <c:pt idx="2">
+                  <c:v>62447</c:v>
+                </c:pt>
+              </c:numCache>
+            </c:numRef>
+          </c:val>
+          <c:extLst>
+            <c:ext xmlns:c16="http://schemas.microsoft.com/office/drawing/2014/chart" uri="{C3380CC4-5D6E-409C-BE32-E72D297353CC}">
+              <c16:uniqueId val="{00000000-AA1C-4CE2-98F8-0A43542E0FFD}"/>
+            </c:ext>
+          </c:extLst>
+        </c:ser>
+        <c:ser>
+          <c:idx val="1"/>
+          <c:order val="1"/>
+          <c:tx>
+            <c:strRef>
+              <c:f>Sheet1!$C$1</c:f>
+              <c:strCache>
+                <c:ptCount val="1"/>
+                <c:pt idx="0">
+                  <c:v>ConcurrentDictionary</c:v>
+                </c:pt>
+              </c:strCache>
+            </c:strRef>
+          </c:tx>
+          <c:spPr>
+            <a:solidFill>
+              <a:schemeClr val="accent2"/>
+            </a:solidFill>
+            <a:ln>
+              <a:noFill/>
+            </a:ln>
+            <a:effectLst/>
+          </c:spPr>
+          <c:invertIfNegative val="0"/>
+          <c:dLbls>
+            <c:spPr>
+              <a:noFill/>
+              <a:ln>
+                <a:noFill/>
+              </a:ln>
+              <a:effectLst/>
+            </c:spPr>
+            <c:txPr>
+              <a:bodyPr rot="0" spcFirstLastPara="1" vertOverflow="ellipsis" vert="horz" wrap="square" lIns="38100" tIns="19050" rIns="38100" bIns="19050" anchor="ctr" anchorCtr="1">
+                <a:spAutoFit/>
+              </a:bodyPr>
+              <a:lstStyle/>
+              <a:p>
+                <a:pPr>
+                  <a:defRPr sz="1197" b="0" i="0" u="none" strike="noStrike" kern="1200" baseline="0">
+                    <a:solidFill>
+                      <a:schemeClr val="tx1">
+                        <a:lumMod val="75000"/>
+                        <a:lumOff val="25000"/>
+                      </a:schemeClr>
+                    </a:solidFill>
+                    <a:latin typeface="+mn-lt"/>
+                    <a:ea typeface="+mn-ea"/>
+                    <a:cs typeface="+mn-cs"/>
+                  </a:defRPr>
+                </a:pPr>
+                <a:endParaRPr lang="de-DE"/>
+              </a:p>
+            </c:txPr>
+            <c:dLblPos val="outEnd"/>
+            <c:showLegendKey val="0"/>
+            <c:showVal val="1"/>
+            <c:showCatName val="0"/>
+            <c:showSerName val="0"/>
+            <c:showPercent val="0"/>
+            <c:showBubbleSize val="0"/>
+            <c:showLeaderLines val="0"/>
+            <c:extLst>
+              <c:ext xmlns:c15="http://schemas.microsoft.com/office/drawing/2012/chart" uri="{CE6537A1-D6FC-4f65-9D91-7224C49458BB}">
+                <c15:showLeaderLines val="1"/>
+                <c15:leaderLines>
+                  <c:spPr>
+                    <a:ln w="9525" cap="flat" cmpd="sng" algn="ctr">
+                      <a:solidFill>
+                        <a:schemeClr val="tx1">
+                          <a:lumMod val="35000"/>
+                          <a:lumOff val="65000"/>
+                        </a:schemeClr>
+                      </a:solidFill>
+                      <a:round/>
+                    </a:ln>
+                    <a:effectLst/>
+                  </c:spPr>
+                </c15:leaderLines>
+              </c:ext>
+            </c:extLst>
+          </c:dLbls>
+          <c:cat>
+            <c:strRef>
+              <c:f>Sheet1!$A$2:$A$4</c:f>
+              <c:strCache>
+                <c:ptCount val="3"/>
+                <c:pt idx="0">
+                  <c:v>10.000 items</c:v>
+                </c:pt>
+                <c:pt idx="1">
+                  <c:v>100.000 items</c:v>
+                </c:pt>
+                <c:pt idx="2">
+                  <c:v>500.000 items</c:v>
+                </c:pt>
+              </c:strCache>
+            </c:strRef>
+          </c:cat>
+          <c:val>
+            <c:numRef>
+              <c:f>Sheet1!$C$2:$C$4</c:f>
+              <c:numCache>
+                <c:formatCode>0</c:formatCode>
+                <c:ptCount val="3"/>
+                <c:pt idx="0">
+                  <c:v>121</c:v>
+                </c:pt>
+                <c:pt idx="1">
+                  <c:v>989</c:v>
+                </c:pt>
+                <c:pt idx="2">
+                  <c:v>9114</c:v>
+                </c:pt>
+              </c:numCache>
+            </c:numRef>
+          </c:val>
+          <c:extLst>
+            <c:ext xmlns:c16="http://schemas.microsoft.com/office/drawing/2014/chart" uri="{C3380CC4-5D6E-409C-BE32-E72D297353CC}">
+              <c16:uniqueId val="{00000001-AA1C-4CE2-98F8-0A43542E0FFD}"/>
+            </c:ext>
+          </c:extLst>
+        </c:ser>
+        <c:ser>
+          <c:idx val="2"/>
+          <c:order val="2"/>
+          <c:tx>
+            <c:strRef>
+              <c:f>Sheet1!$D$1</c:f>
+              <c:strCache>
+                <c:ptCount val="1"/>
+                <c:pt idx="0">
+                  <c:v>Lock-FreeDictionary</c:v>
+                </c:pt>
+              </c:strCache>
+            </c:strRef>
+          </c:tx>
+          <c:spPr>
+            <a:solidFill>
+              <a:schemeClr val="accent3"/>
+            </a:solidFill>
+            <a:ln>
+              <a:noFill/>
+            </a:ln>
+            <a:effectLst/>
+          </c:spPr>
+          <c:invertIfNegative val="0"/>
+          <c:dLbls>
+            <c:spPr>
+              <a:noFill/>
+              <a:ln>
+                <a:noFill/>
+              </a:ln>
+              <a:effectLst/>
+            </c:spPr>
+            <c:txPr>
+              <a:bodyPr rot="0" spcFirstLastPara="1" vertOverflow="ellipsis" vert="horz" wrap="square" lIns="38100" tIns="19050" rIns="38100" bIns="19050" anchor="ctr" anchorCtr="1">
+                <a:spAutoFit/>
+              </a:bodyPr>
+              <a:lstStyle/>
+              <a:p>
+                <a:pPr>
+                  <a:defRPr sz="1197" b="0" i="0" u="none" strike="noStrike" kern="1200" baseline="0">
+                    <a:solidFill>
+                      <a:schemeClr val="tx1">
+                        <a:lumMod val="75000"/>
+                        <a:lumOff val="25000"/>
+                      </a:schemeClr>
+                    </a:solidFill>
+                    <a:latin typeface="+mn-lt"/>
+                    <a:ea typeface="+mn-ea"/>
+                    <a:cs typeface="+mn-cs"/>
+                  </a:defRPr>
+                </a:pPr>
+                <a:endParaRPr lang="de-DE"/>
+              </a:p>
+            </c:txPr>
+            <c:dLblPos val="outEnd"/>
+            <c:showLegendKey val="0"/>
+            <c:showVal val="1"/>
+            <c:showCatName val="0"/>
+            <c:showSerName val="0"/>
+            <c:showPercent val="0"/>
+            <c:showBubbleSize val="0"/>
+            <c:showLeaderLines val="0"/>
+            <c:extLst>
+              <c:ext xmlns:c15="http://schemas.microsoft.com/office/drawing/2012/chart" uri="{CE6537A1-D6FC-4f65-9D91-7224C49458BB}">
+                <c15:showLeaderLines val="1"/>
+                <c15:leaderLines>
+                  <c:spPr>
+                    <a:ln w="9525" cap="flat" cmpd="sng" algn="ctr">
+                      <a:solidFill>
+                        <a:schemeClr val="tx1">
+                          <a:lumMod val="35000"/>
+                          <a:lumOff val="65000"/>
+                        </a:schemeClr>
+                      </a:solidFill>
+                      <a:round/>
+                    </a:ln>
+                    <a:effectLst/>
+                  </c:spPr>
+                </c15:leaderLines>
+              </c:ext>
+            </c:extLst>
+          </c:dLbls>
+          <c:cat>
+            <c:strRef>
+              <c:f>Sheet1!$A$2:$A$4</c:f>
+              <c:strCache>
+                <c:ptCount val="3"/>
+                <c:pt idx="0">
+                  <c:v>10.000 items</c:v>
+                </c:pt>
+                <c:pt idx="1">
+                  <c:v>100.000 items</c:v>
+                </c:pt>
+                <c:pt idx="2">
+                  <c:v>500.000 items</c:v>
+                </c:pt>
+              </c:strCache>
+            </c:strRef>
+          </c:cat>
+          <c:val>
+            <c:numRef>
+              <c:f>Sheet1!$D$2:$D$4</c:f>
+              <c:numCache>
+                <c:formatCode>0</c:formatCode>
+                <c:ptCount val="3"/>
+                <c:pt idx="0">
+                  <c:v>145</c:v>
+                </c:pt>
+                <c:pt idx="1">
+                  <c:v>1146</c:v>
+                </c:pt>
+                <c:pt idx="2">
+                  <c:v>8962</c:v>
+                </c:pt>
+              </c:numCache>
+            </c:numRef>
+          </c:val>
+          <c:extLst>
+            <c:ext xmlns:c16="http://schemas.microsoft.com/office/drawing/2014/chart" uri="{C3380CC4-5D6E-409C-BE32-E72D297353CC}">
+              <c16:uniqueId val="{00000002-AA1C-4CE2-98F8-0A43542E0FFD}"/>
+            </c:ext>
+          </c:extLst>
+        </c:ser>
+        <c:dLbls>
+          <c:dLblPos val="outEnd"/>
+          <c:showLegendKey val="0"/>
+          <c:showVal val="1"/>
+          <c:showCatName val="0"/>
+          <c:showSerName val="0"/>
+          <c:showPercent val="0"/>
+          <c:showBubbleSize val="0"/>
+        </c:dLbls>
+        <c:gapWidth val="219"/>
+        <c:overlap val="-27"/>
+        <c:axId val="501052272"/>
+        <c:axId val="501055880"/>
+      </c:barChart>
+      <c:catAx>
+        <c:axId val="501052272"/>
+        <c:scaling>
+          <c:orientation val="minMax"/>
+        </c:scaling>
+        <c:delete val="0"/>
+        <c:axPos val="b"/>
+        <c:numFmt formatCode="General" sourceLinked="1"/>
+        <c:majorTickMark val="none"/>
+        <c:minorTickMark val="none"/>
+        <c:tickLblPos val="nextTo"/>
+        <c:spPr>
+          <a:noFill/>
+          <a:ln w="9525" cap="flat" cmpd="sng" algn="ctr">
+            <a:solidFill>
+              <a:schemeClr val="tx1">
+                <a:lumMod val="15000"/>
+                <a:lumOff val="85000"/>
+              </a:schemeClr>
+            </a:solidFill>
+            <a:round/>
+          </a:ln>
+          <a:effectLst/>
+        </c:spPr>
+        <c:txPr>
+          <a:bodyPr rot="-60000000" spcFirstLastPara="1" vertOverflow="ellipsis" vert="horz" wrap="square" anchor="ctr" anchorCtr="1"/>
+          <a:lstStyle/>
+          <a:p>
+            <a:pPr>
+              <a:defRPr sz="1197" b="0" i="0" u="none" strike="noStrike" kern="1200" baseline="0">
+                <a:solidFill>
+                  <a:schemeClr val="tx1">
+                    <a:lumMod val="65000"/>
+                    <a:lumOff val="35000"/>
+                  </a:schemeClr>
+                </a:solidFill>
+                <a:latin typeface="+mn-lt"/>
+                <a:ea typeface="+mn-ea"/>
+                <a:cs typeface="+mn-cs"/>
+              </a:defRPr>
+            </a:pPr>
+            <a:endParaRPr lang="de-DE"/>
+          </a:p>
+        </c:txPr>
+        <c:crossAx val="501055880"/>
+        <c:crosses val="autoZero"/>
+        <c:auto val="1"/>
+        <c:lblAlgn val="ctr"/>
+        <c:lblOffset val="100"/>
+        <c:noMultiLvlLbl val="0"/>
+      </c:catAx>
+      <c:valAx>
+        <c:axId val="501055880"/>
+        <c:scaling>
+          <c:orientation val="minMax"/>
+        </c:scaling>
+        <c:delete val="0"/>
+        <c:axPos val="l"/>
+        <c:majorGridlines>
+          <c:spPr>
+            <a:ln w="9525" cap="flat" cmpd="sng" algn="ctr">
+              <a:solidFill>
+                <a:schemeClr val="tx1">
+                  <a:lumMod val="15000"/>
+                  <a:lumOff val="85000"/>
+                </a:schemeClr>
+              </a:solidFill>
+              <a:round/>
+            </a:ln>
+            <a:effectLst/>
+          </c:spPr>
+        </c:majorGridlines>
+        <c:numFmt formatCode="0" sourceLinked="1"/>
+        <c:majorTickMark val="none"/>
+        <c:minorTickMark val="none"/>
+        <c:tickLblPos val="nextTo"/>
+        <c:spPr>
+          <a:noFill/>
+          <a:ln>
+            <a:noFill/>
+          </a:ln>
+          <a:effectLst/>
+        </c:spPr>
+        <c:txPr>
+          <a:bodyPr rot="-60000000" spcFirstLastPara="1" vertOverflow="ellipsis" vert="horz" wrap="square" anchor="ctr" anchorCtr="1"/>
+          <a:lstStyle/>
+          <a:p>
+            <a:pPr>
+              <a:defRPr sz="1197" b="0" i="0" u="none" strike="noStrike" kern="1200" baseline="0">
+                <a:solidFill>
+                  <a:schemeClr val="tx1">
+                    <a:lumMod val="65000"/>
+                    <a:lumOff val="35000"/>
+                  </a:schemeClr>
+                </a:solidFill>
+                <a:latin typeface="+mn-lt"/>
+                <a:ea typeface="+mn-ea"/>
+                <a:cs typeface="+mn-cs"/>
+              </a:defRPr>
+            </a:pPr>
+            <a:endParaRPr lang="de-DE"/>
+          </a:p>
+        </c:txPr>
+        <c:crossAx val="501052272"/>
+        <c:crosses val="autoZero"/>
+        <c:crossBetween val="between"/>
+      </c:valAx>
+      <c:spPr>
+        <a:noFill/>
+        <a:ln>
+          <a:noFill/>
+        </a:ln>
+        <a:effectLst/>
+      </c:spPr>
+    </c:plotArea>
+    <c:legend>
+      <c:legendPos val="b"/>
+      <c:overlay val="0"/>
+      <c:spPr>
+        <a:noFill/>
+        <a:ln>
+          <a:noFill/>
+        </a:ln>
+        <a:effectLst/>
+      </c:spPr>
+      <c:txPr>
+        <a:bodyPr rot="0" spcFirstLastPara="1" vertOverflow="ellipsis" vert="horz" wrap="square" anchor="ctr" anchorCtr="1"/>
+        <a:lstStyle/>
+        <a:p>
+          <a:pPr>
+            <a:defRPr sz="1197" b="0" i="0" u="none" strike="noStrike" kern="1200" baseline="0">
+              <a:solidFill>
+                <a:schemeClr val="tx1">
+                  <a:lumMod val="65000"/>
+                  <a:lumOff val="35000"/>
+                </a:schemeClr>
+              </a:solidFill>
+              <a:latin typeface="+mn-lt"/>
+              <a:ea typeface="+mn-ea"/>
+              <a:cs typeface="+mn-cs"/>
+            </a:defRPr>
+          </a:pPr>
+          <a:endParaRPr lang="de-DE"/>
+        </a:p>
+      </c:txPr>
+    </c:legend>
+    <c:plotVisOnly val="1"/>
+    <c:dispBlanksAs val="gap"/>
+    <c:showDLblsOverMax val="0"/>
+  </c:chart>
+  <c:spPr>
+    <a:noFill/>
+    <a:ln>
+      <a:noFill/>
+    </a:ln>
+    <a:effectLst/>
+  </c:spPr>
+  <c:txPr>
+    <a:bodyPr/>
+    <a:lstStyle/>
+    <a:p>
+      <a:pPr>
+        <a:defRPr/>
+      </a:pPr>
+      <a:endParaRPr lang="de-DE"/>
+    </a:p>
+  </c:txPr>
+  <c:externalData r:id="rId3">
+    <c:autoUpdate val="0"/>
+  </c:externalData>
+</c:chartSpace>
+</file>
+
+<file path=ppt/charts/chart2.xml><?xml version="1.0" encoding="utf-8"?>
+<c:chartSpace xmlns:c="http://schemas.openxmlformats.org/drawingml/2006/chart" xmlns:a="http://schemas.openxmlformats.org/drawingml/2006/main" xmlns:r="http://schemas.openxmlformats.org/officeDocument/2006/relationships" xmlns:c16r2="http://schemas.microsoft.com/office/drawing/2015/06/chart">
+  <c:date1904 val="0"/>
+  <c:lang val="en-US"/>
+  <c:roundedCorners val="0"/>
+  <mc:AlternateContent xmlns:mc="http://schemas.openxmlformats.org/markup-compatibility/2006">
+    <mc:Choice xmlns:c14="http://schemas.microsoft.com/office/drawing/2007/8/2/chart" Requires="c14">
+      <c14:style val="102"/>
+    </mc:Choice>
+    <mc:Fallback>
+      <c:style val="2"/>
+    </mc:Fallback>
+  </mc:AlternateContent>
+  <c:chart>
+    <c:title>
+      <c:tx>
+        <c:rich>
+          <a:bodyPr rot="0" spcFirstLastPara="1" vertOverflow="ellipsis" vert="horz" wrap="square" anchor="ctr" anchorCtr="1"/>
+          <a:lstStyle/>
+          <a:p>
+            <a:pPr>
+              <a:defRPr sz="1862" b="0" i="0" u="none" strike="noStrike" kern="1200" spc="0" baseline="0">
+                <a:solidFill>
+                  <a:schemeClr val="tx1">
+                    <a:lumMod val="65000"/>
+                    <a:lumOff val="35000"/>
+                  </a:schemeClr>
+                </a:solidFill>
+                <a:latin typeface="+mn-lt"/>
+                <a:ea typeface="+mn-ea"/>
+                <a:cs typeface="+mn-cs"/>
+              </a:defRPr>
+            </a:pPr>
+            <a:r>
+              <a:rPr lang="en-US" noProof="0" dirty="0"/>
+              <a:t>Add from</a:t>
+            </a:r>
+            <a:r>
+              <a:rPr lang="en-US" baseline="0" noProof="0" dirty="0"/>
+              <a:t> Single Thread, in microseconds</a:t>
+            </a:r>
+            <a:endParaRPr lang="en-US" noProof="0" dirty="0"/>
+          </a:p>
+        </c:rich>
+      </c:tx>
+      <c:overlay val="0"/>
+      <c:spPr>
+        <a:noFill/>
+        <a:ln>
+          <a:noFill/>
+        </a:ln>
+        <a:effectLst/>
+      </c:spPr>
+      <c:txPr>
+        <a:bodyPr rot="0" spcFirstLastPara="1" vertOverflow="ellipsis" vert="horz" wrap="square" anchor="ctr" anchorCtr="1"/>
+        <a:lstStyle/>
+        <a:p>
+          <a:pPr>
+            <a:defRPr sz="1862" b="0" i="0" u="none" strike="noStrike" kern="1200" spc="0" baseline="0">
+              <a:solidFill>
+                <a:schemeClr val="tx1">
+                  <a:lumMod val="65000"/>
+                  <a:lumOff val="35000"/>
+                </a:schemeClr>
+              </a:solidFill>
+              <a:latin typeface="+mn-lt"/>
+              <a:ea typeface="+mn-ea"/>
+              <a:cs typeface="+mn-cs"/>
+            </a:defRPr>
+          </a:pPr>
+          <a:endParaRPr lang="de-DE"/>
+        </a:p>
+      </c:txPr>
+    </c:title>
+    <c:autoTitleDeleted val="0"/>
+    <c:plotArea>
+      <c:layout/>
+      <c:barChart>
+        <c:barDir val="col"/>
+        <c:grouping val="clustered"/>
+        <c:varyColors val="0"/>
+        <c:ser>
+          <c:idx val="0"/>
+          <c:order val="0"/>
+          <c:tx>
+            <c:strRef>
+              <c:f>Sheet1!$B$1</c:f>
+              <c:strCache>
+                <c:ptCount val="1"/>
+                <c:pt idx="0">
+                  <c:v>Dictionary</c:v>
+                </c:pt>
+              </c:strCache>
+            </c:strRef>
+          </c:tx>
+          <c:spPr>
+            <a:solidFill>
+              <a:schemeClr val="accent1"/>
+            </a:solidFill>
+            <a:ln>
+              <a:noFill/>
+            </a:ln>
+            <a:effectLst/>
+          </c:spPr>
+          <c:invertIfNegative val="0"/>
+          <c:dLbls>
+            <c:spPr>
+              <a:noFill/>
+              <a:ln>
+                <a:noFill/>
+              </a:ln>
+              <a:effectLst/>
+            </c:spPr>
+            <c:txPr>
+              <a:bodyPr rot="0" spcFirstLastPara="1" vertOverflow="ellipsis" vert="horz" wrap="square" lIns="38100" tIns="19050" rIns="38100" bIns="19050" anchor="ctr" anchorCtr="1">
+                <a:spAutoFit/>
+              </a:bodyPr>
+              <a:lstStyle/>
+              <a:p>
+                <a:pPr>
+                  <a:defRPr sz="1197" b="0" i="0" u="none" strike="noStrike" kern="1200" baseline="0">
+                    <a:solidFill>
+                      <a:schemeClr val="tx1">
+                        <a:lumMod val="75000"/>
+                        <a:lumOff val="25000"/>
+                      </a:schemeClr>
+                    </a:solidFill>
+                    <a:latin typeface="+mn-lt"/>
+                    <a:ea typeface="+mn-ea"/>
+                    <a:cs typeface="+mn-cs"/>
+                  </a:defRPr>
+                </a:pPr>
+                <a:endParaRPr lang="de-DE"/>
+              </a:p>
+            </c:txPr>
+            <c:dLblPos val="outEnd"/>
+            <c:showLegendKey val="0"/>
+            <c:showVal val="1"/>
+            <c:showCatName val="0"/>
+            <c:showSerName val="0"/>
+            <c:showPercent val="0"/>
+            <c:showBubbleSize val="0"/>
+            <c:showLeaderLines val="0"/>
+            <c:extLst>
+              <c:ext xmlns:c15="http://schemas.microsoft.com/office/drawing/2012/chart" uri="{CE6537A1-D6FC-4f65-9D91-7224C49458BB}">
+                <c15:showLeaderLines val="1"/>
+                <c15:leaderLines>
+                  <c:spPr>
+                    <a:ln w="9525" cap="flat" cmpd="sng" algn="ctr">
+                      <a:solidFill>
+                        <a:schemeClr val="tx1">
+                          <a:lumMod val="35000"/>
+                          <a:lumOff val="65000"/>
+                        </a:schemeClr>
+                      </a:solidFill>
+                      <a:round/>
+                    </a:ln>
+                    <a:effectLst/>
+                  </c:spPr>
+                </c15:leaderLines>
+              </c:ext>
+            </c:extLst>
+          </c:dLbls>
+          <c:cat>
+            <c:strRef>
+              <c:f>Sheet1!$A$2:$A$4</c:f>
+              <c:strCache>
+                <c:ptCount val="3"/>
+                <c:pt idx="0">
+                  <c:v>10.000 items</c:v>
+                </c:pt>
+                <c:pt idx="1">
+                  <c:v>100.000 items</c:v>
+                </c:pt>
+                <c:pt idx="2">
+                  <c:v>500.000 items</c:v>
+                </c:pt>
+              </c:strCache>
+            </c:strRef>
+          </c:cat>
+          <c:val>
+            <c:numRef>
+              <c:f>Sheet1!$B$2:$B$4</c:f>
+              <c:numCache>
+                <c:formatCode>General</c:formatCode>
+                <c:ptCount val="3"/>
+                <c:pt idx="0">
+                  <c:v>639</c:v>
+                </c:pt>
+                <c:pt idx="1">
+                  <c:v>11796</c:v>
+                </c:pt>
+                <c:pt idx="2">
+                  <c:v>114391</c:v>
+                </c:pt>
+              </c:numCache>
+            </c:numRef>
+          </c:val>
+          <c:extLst>
+            <c:ext xmlns:c16="http://schemas.microsoft.com/office/drawing/2014/chart" uri="{C3380CC4-5D6E-409C-BE32-E72D297353CC}">
+              <c16:uniqueId val="{00000000-E600-419D-A89E-822214AD8D98}"/>
+            </c:ext>
+          </c:extLst>
+        </c:ser>
+        <c:ser>
+          <c:idx val="1"/>
+          <c:order val="1"/>
+          <c:tx>
+            <c:strRef>
+              <c:f>Sheet1!$C$1</c:f>
+              <c:strCache>
+                <c:ptCount val="1"/>
+                <c:pt idx="0">
+                  <c:v>ConcurrentDictionary</c:v>
+                </c:pt>
+              </c:strCache>
+            </c:strRef>
+          </c:tx>
+          <c:spPr>
+            <a:solidFill>
+              <a:schemeClr val="accent2"/>
+            </a:solidFill>
+            <a:ln>
+              <a:noFill/>
+            </a:ln>
+            <a:effectLst/>
+          </c:spPr>
+          <c:invertIfNegative val="0"/>
+          <c:dLbls>
+            <c:spPr>
+              <a:noFill/>
+              <a:ln>
+                <a:noFill/>
+              </a:ln>
+              <a:effectLst/>
+            </c:spPr>
+            <c:txPr>
+              <a:bodyPr rot="0" spcFirstLastPara="1" vertOverflow="ellipsis" vert="horz" wrap="square" lIns="38100" tIns="19050" rIns="38100" bIns="19050" anchor="ctr" anchorCtr="1">
+                <a:spAutoFit/>
+              </a:bodyPr>
+              <a:lstStyle/>
+              <a:p>
+                <a:pPr>
+                  <a:defRPr sz="1197" b="0" i="0" u="none" strike="noStrike" kern="1200" baseline="0">
+                    <a:solidFill>
+                      <a:schemeClr val="tx1">
+                        <a:lumMod val="75000"/>
+                        <a:lumOff val="25000"/>
+                      </a:schemeClr>
+                    </a:solidFill>
+                    <a:latin typeface="+mn-lt"/>
+                    <a:ea typeface="+mn-ea"/>
+                    <a:cs typeface="+mn-cs"/>
+                  </a:defRPr>
+                </a:pPr>
+                <a:endParaRPr lang="de-DE"/>
+              </a:p>
+            </c:txPr>
+            <c:dLblPos val="outEnd"/>
+            <c:showLegendKey val="0"/>
+            <c:showVal val="1"/>
+            <c:showCatName val="0"/>
+            <c:showSerName val="0"/>
+            <c:showPercent val="0"/>
+            <c:showBubbleSize val="0"/>
+            <c:showLeaderLines val="0"/>
+            <c:extLst>
+              <c:ext xmlns:c15="http://schemas.microsoft.com/office/drawing/2012/chart" uri="{CE6537A1-D6FC-4f65-9D91-7224C49458BB}">
+                <c15:showLeaderLines val="1"/>
+                <c15:leaderLines>
+                  <c:spPr>
+                    <a:ln w="9525" cap="flat" cmpd="sng" algn="ctr">
+                      <a:solidFill>
+                        <a:schemeClr val="tx1">
+                          <a:lumMod val="35000"/>
+                          <a:lumOff val="65000"/>
+                        </a:schemeClr>
+                      </a:solidFill>
+                      <a:round/>
+                    </a:ln>
+                    <a:effectLst/>
+                  </c:spPr>
+                </c15:leaderLines>
+              </c:ext>
+            </c:extLst>
+          </c:dLbls>
+          <c:cat>
+            <c:strRef>
+              <c:f>Sheet1!$A$2:$A$4</c:f>
+              <c:strCache>
+                <c:ptCount val="3"/>
+                <c:pt idx="0">
+                  <c:v>10.000 items</c:v>
+                </c:pt>
+                <c:pt idx="1">
+                  <c:v>100.000 items</c:v>
+                </c:pt>
+                <c:pt idx="2">
+                  <c:v>500.000 items</c:v>
+                </c:pt>
+              </c:strCache>
+            </c:strRef>
+          </c:cat>
+          <c:val>
+            <c:numRef>
+              <c:f>Sheet1!$C$2:$C$4</c:f>
+              <c:numCache>
+                <c:formatCode>General</c:formatCode>
+                <c:ptCount val="3"/>
+                <c:pt idx="0">
+                  <c:v>3527</c:v>
+                </c:pt>
+                <c:pt idx="1">
+                  <c:v>49266</c:v>
+                </c:pt>
+                <c:pt idx="2">
+                  <c:v>423596</c:v>
+                </c:pt>
+              </c:numCache>
+            </c:numRef>
+          </c:val>
+          <c:extLst>
+            <c:ext xmlns:c16="http://schemas.microsoft.com/office/drawing/2014/chart" uri="{C3380CC4-5D6E-409C-BE32-E72D297353CC}">
+              <c16:uniqueId val="{00000001-E600-419D-A89E-822214AD8D98}"/>
+            </c:ext>
+          </c:extLst>
+        </c:ser>
+        <c:ser>
+          <c:idx val="2"/>
+          <c:order val="2"/>
+          <c:tx>
+            <c:strRef>
+              <c:f>Sheet1!$D$1</c:f>
+              <c:strCache>
+                <c:ptCount val="1"/>
+                <c:pt idx="0">
+                  <c:v>Lock-Free Dictionary</c:v>
+                </c:pt>
+              </c:strCache>
+            </c:strRef>
+          </c:tx>
+          <c:spPr>
+            <a:solidFill>
+              <a:schemeClr val="accent3"/>
+            </a:solidFill>
+            <a:ln>
+              <a:noFill/>
+            </a:ln>
+            <a:effectLst/>
+          </c:spPr>
+          <c:invertIfNegative val="0"/>
+          <c:dLbls>
+            <c:spPr>
+              <a:noFill/>
+              <a:ln>
+                <a:noFill/>
+              </a:ln>
+              <a:effectLst/>
+            </c:spPr>
+            <c:txPr>
+              <a:bodyPr rot="0" spcFirstLastPara="1" vertOverflow="ellipsis" vert="horz" wrap="square" lIns="38100" tIns="19050" rIns="38100" bIns="19050" anchor="ctr" anchorCtr="1">
+                <a:spAutoFit/>
+              </a:bodyPr>
+              <a:lstStyle/>
+              <a:p>
+                <a:pPr>
+                  <a:defRPr sz="1197" b="0" i="0" u="none" strike="noStrike" kern="1200" baseline="0">
+                    <a:solidFill>
+                      <a:schemeClr val="tx1">
+                        <a:lumMod val="75000"/>
+                        <a:lumOff val="25000"/>
+                      </a:schemeClr>
+                    </a:solidFill>
+                    <a:latin typeface="+mn-lt"/>
+                    <a:ea typeface="+mn-ea"/>
+                    <a:cs typeface="+mn-cs"/>
+                  </a:defRPr>
+                </a:pPr>
+                <a:endParaRPr lang="de-DE"/>
+              </a:p>
+            </c:txPr>
+            <c:dLblPos val="outEnd"/>
+            <c:showLegendKey val="0"/>
+            <c:showVal val="1"/>
+            <c:showCatName val="0"/>
+            <c:showSerName val="0"/>
+            <c:showPercent val="0"/>
+            <c:showBubbleSize val="0"/>
+            <c:showLeaderLines val="0"/>
+            <c:extLst>
+              <c:ext xmlns:c15="http://schemas.microsoft.com/office/drawing/2012/chart" uri="{CE6537A1-D6FC-4f65-9D91-7224C49458BB}">
+                <c15:showLeaderLines val="1"/>
+                <c15:leaderLines>
+                  <c:spPr>
+                    <a:ln w="9525" cap="flat" cmpd="sng" algn="ctr">
+                      <a:solidFill>
+                        <a:schemeClr val="tx1">
+                          <a:lumMod val="35000"/>
+                          <a:lumOff val="65000"/>
+                        </a:schemeClr>
+                      </a:solidFill>
+                      <a:round/>
+                    </a:ln>
+                    <a:effectLst/>
+                  </c:spPr>
+                </c15:leaderLines>
+              </c:ext>
+            </c:extLst>
+          </c:dLbls>
+          <c:cat>
+            <c:strRef>
+              <c:f>Sheet1!$A$2:$A$4</c:f>
+              <c:strCache>
+                <c:ptCount val="3"/>
+                <c:pt idx="0">
+                  <c:v>10.000 items</c:v>
+                </c:pt>
+                <c:pt idx="1">
+                  <c:v>100.000 items</c:v>
+                </c:pt>
+                <c:pt idx="2">
+                  <c:v>500.000 items</c:v>
+                </c:pt>
+              </c:strCache>
+            </c:strRef>
+          </c:cat>
+          <c:val>
+            <c:numRef>
+              <c:f>Sheet1!$D$2:$D$4</c:f>
+              <c:numCache>
+                <c:formatCode>General</c:formatCode>
+                <c:ptCount val="3"/>
+                <c:pt idx="0">
+                  <c:v>5632</c:v>
+                </c:pt>
+                <c:pt idx="1">
+                  <c:v>85577</c:v>
+                </c:pt>
+                <c:pt idx="2">
+                  <c:v>799369</c:v>
+                </c:pt>
+              </c:numCache>
+            </c:numRef>
+          </c:val>
+          <c:extLst>
+            <c:ext xmlns:c16="http://schemas.microsoft.com/office/drawing/2014/chart" uri="{C3380CC4-5D6E-409C-BE32-E72D297353CC}">
+              <c16:uniqueId val="{00000002-E600-419D-A89E-822214AD8D98}"/>
+            </c:ext>
+          </c:extLst>
+        </c:ser>
+        <c:dLbls>
+          <c:dLblPos val="outEnd"/>
+          <c:showLegendKey val="0"/>
+          <c:showVal val="1"/>
+          <c:showCatName val="0"/>
+          <c:showSerName val="0"/>
+          <c:showPercent val="0"/>
+          <c:showBubbleSize val="0"/>
+        </c:dLbls>
+        <c:gapWidth val="219"/>
+        <c:overlap val="-27"/>
+        <c:axId val="555102792"/>
+        <c:axId val="555098856"/>
+      </c:barChart>
+      <c:catAx>
+        <c:axId val="555102792"/>
+        <c:scaling>
+          <c:orientation val="minMax"/>
+        </c:scaling>
+        <c:delete val="0"/>
+        <c:axPos val="b"/>
+        <c:numFmt formatCode="General" sourceLinked="1"/>
+        <c:majorTickMark val="none"/>
+        <c:minorTickMark val="none"/>
+        <c:tickLblPos val="nextTo"/>
+        <c:spPr>
+          <a:noFill/>
+          <a:ln w="9525" cap="flat" cmpd="sng" algn="ctr">
+            <a:solidFill>
+              <a:schemeClr val="tx1">
+                <a:lumMod val="15000"/>
+                <a:lumOff val="85000"/>
+              </a:schemeClr>
+            </a:solidFill>
+            <a:round/>
+          </a:ln>
+          <a:effectLst/>
+        </c:spPr>
+        <c:txPr>
+          <a:bodyPr rot="-60000000" spcFirstLastPara="1" vertOverflow="ellipsis" vert="horz" wrap="square" anchor="ctr" anchorCtr="1"/>
+          <a:lstStyle/>
+          <a:p>
+            <a:pPr>
+              <a:defRPr sz="1197" b="0" i="0" u="none" strike="noStrike" kern="1200" baseline="0">
+                <a:solidFill>
+                  <a:schemeClr val="tx1">
+                    <a:lumMod val="65000"/>
+                    <a:lumOff val="35000"/>
+                  </a:schemeClr>
+                </a:solidFill>
+                <a:latin typeface="+mn-lt"/>
+                <a:ea typeface="+mn-ea"/>
+                <a:cs typeface="+mn-cs"/>
+              </a:defRPr>
+            </a:pPr>
+            <a:endParaRPr lang="de-DE"/>
+          </a:p>
+        </c:txPr>
+        <c:crossAx val="555098856"/>
+        <c:crosses val="autoZero"/>
+        <c:auto val="1"/>
+        <c:lblAlgn val="ctr"/>
+        <c:lblOffset val="100"/>
+        <c:noMultiLvlLbl val="0"/>
+      </c:catAx>
+      <c:valAx>
+        <c:axId val="555098856"/>
+        <c:scaling>
+          <c:orientation val="minMax"/>
+        </c:scaling>
+        <c:delete val="0"/>
+        <c:axPos val="l"/>
+        <c:majorGridlines>
+          <c:spPr>
+            <a:ln w="9525" cap="flat" cmpd="sng" algn="ctr">
+              <a:solidFill>
+                <a:schemeClr val="tx1">
+                  <a:lumMod val="15000"/>
+                  <a:lumOff val="85000"/>
+                </a:schemeClr>
+              </a:solidFill>
+              <a:round/>
+            </a:ln>
+            <a:effectLst/>
+          </c:spPr>
+        </c:majorGridlines>
+        <c:numFmt formatCode="General" sourceLinked="1"/>
+        <c:majorTickMark val="none"/>
+        <c:minorTickMark val="none"/>
+        <c:tickLblPos val="nextTo"/>
+        <c:spPr>
+          <a:noFill/>
+          <a:ln>
+            <a:noFill/>
+          </a:ln>
+          <a:effectLst/>
+        </c:spPr>
+        <c:txPr>
+          <a:bodyPr rot="-60000000" spcFirstLastPara="1" vertOverflow="ellipsis" vert="horz" wrap="square" anchor="ctr" anchorCtr="1"/>
+          <a:lstStyle/>
+          <a:p>
+            <a:pPr>
+              <a:defRPr sz="1197" b="0" i="0" u="none" strike="noStrike" kern="1200" baseline="0">
+                <a:solidFill>
+                  <a:schemeClr val="tx1">
+                    <a:lumMod val="65000"/>
+                    <a:lumOff val="35000"/>
+                  </a:schemeClr>
+                </a:solidFill>
+                <a:latin typeface="+mn-lt"/>
+                <a:ea typeface="+mn-ea"/>
+                <a:cs typeface="+mn-cs"/>
+              </a:defRPr>
+            </a:pPr>
+            <a:endParaRPr lang="de-DE"/>
+          </a:p>
+        </c:txPr>
+        <c:crossAx val="555102792"/>
+        <c:crosses val="autoZero"/>
+        <c:crossBetween val="between"/>
+      </c:valAx>
+      <c:spPr>
+        <a:noFill/>
+        <a:ln>
+          <a:noFill/>
+        </a:ln>
+        <a:effectLst/>
+      </c:spPr>
+    </c:plotArea>
+    <c:legend>
+      <c:legendPos val="b"/>
+      <c:overlay val="0"/>
+      <c:spPr>
+        <a:noFill/>
+        <a:ln>
+          <a:noFill/>
+        </a:ln>
+        <a:effectLst/>
+      </c:spPr>
+      <c:txPr>
+        <a:bodyPr rot="0" spcFirstLastPara="1" vertOverflow="ellipsis" vert="horz" wrap="square" anchor="ctr" anchorCtr="1"/>
+        <a:lstStyle/>
+        <a:p>
+          <a:pPr>
+            <a:defRPr sz="1197" b="0" i="0" u="none" strike="noStrike" kern="1200" baseline="0">
+              <a:solidFill>
+                <a:schemeClr val="tx1">
+                  <a:lumMod val="65000"/>
+                  <a:lumOff val="35000"/>
+                </a:schemeClr>
+              </a:solidFill>
+              <a:latin typeface="+mn-lt"/>
+              <a:ea typeface="+mn-ea"/>
+              <a:cs typeface="+mn-cs"/>
+            </a:defRPr>
+          </a:pPr>
+          <a:endParaRPr lang="de-DE"/>
+        </a:p>
+      </c:txPr>
+    </c:legend>
+    <c:plotVisOnly val="1"/>
+    <c:dispBlanksAs val="gap"/>
+    <c:showDLblsOverMax val="0"/>
+  </c:chart>
+  <c:spPr>
+    <a:noFill/>
+    <a:ln>
+      <a:noFill/>
+    </a:ln>
+    <a:effectLst/>
+  </c:spPr>
+  <c:txPr>
+    <a:bodyPr/>
+    <a:lstStyle/>
+    <a:p>
+      <a:pPr>
+        <a:defRPr/>
+      </a:pPr>
+      <a:endParaRPr lang="de-DE"/>
+    </a:p>
+  </c:txPr>
+  <c:externalData r:id="rId3">
+    <c:autoUpdate val="0"/>
+  </c:externalData>
+</c:chartSpace>
+</file>
+
+<file path=ppt/charts/colors1.xml><?xml version="1.0" encoding="utf-8"?>
+<cs:colorStyle xmlns:cs="http://schemas.microsoft.com/office/drawing/2012/chartStyle" xmlns:a="http://schemas.openxmlformats.org/drawingml/2006/main" meth="cycle" id="10">
+  <a:schemeClr val="accent1"/>
+  <a:schemeClr val="accent2"/>
+  <a:schemeClr val="accent3"/>
+  <a:schemeClr val="accent4"/>
+  <a:schemeClr val="accent5"/>
+  <a:schemeClr val="accent6"/>
+  <cs:variation/>
+  <cs:variation>
+    <a:lumMod val="60000"/>
+  </cs:variation>
+  <cs:variation>
+    <a:lumMod val="80000"/>
+    <a:lumOff val="20000"/>
+  </cs:variation>
+  <cs:variation>
+    <a:lumMod val="80000"/>
+  </cs:variation>
+  <cs:variation>
+    <a:lumMod val="60000"/>
+    <a:lumOff val="40000"/>
+  </cs:variation>
+  <cs:variation>
+    <a:lumMod val="50000"/>
+  </cs:variation>
+  <cs:variation>
+    <a:lumMod val="70000"/>
+    <a:lumOff val="30000"/>
+  </cs:variation>
+  <cs:variation>
+    <a:lumMod val="70000"/>
+  </cs:variation>
+  <cs:variation>
+    <a:lumMod val="50000"/>
+    <a:lumOff val="50000"/>
+  </cs:variation>
+</cs:colorStyle>
+</file>
+
+<file path=ppt/charts/colors2.xml><?xml version="1.0" encoding="utf-8"?>
+<cs:colorStyle xmlns:cs="http://schemas.microsoft.com/office/drawing/2012/chartStyle" xmlns:a="http://schemas.openxmlformats.org/drawingml/2006/main" meth="cycle" id="10">
+  <a:schemeClr val="accent1"/>
+  <a:schemeClr val="accent2"/>
+  <a:schemeClr val="accent3"/>
+  <a:schemeClr val="accent4"/>
+  <a:schemeClr val="accent5"/>
+  <a:schemeClr val="accent6"/>
+  <cs:variation/>
+  <cs:variation>
+    <a:lumMod val="60000"/>
+  </cs:variation>
+  <cs:variation>
+    <a:lumMod val="80000"/>
+    <a:lumOff val="20000"/>
+  </cs:variation>
+  <cs:variation>
+    <a:lumMod val="80000"/>
+  </cs:variation>
+  <cs:variation>
+    <a:lumMod val="60000"/>
+    <a:lumOff val="40000"/>
+  </cs:variation>
+  <cs:variation>
+    <a:lumMod val="50000"/>
+  </cs:variation>
+  <cs:variation>
+    <a:lumMod val="70000"/>
+    <a:lumOff val="30000"/>
+  </cs:variation>
+  <cs:variation>
+    <a:lumMod val="70000"/>
+  </cs:variation>
+  <cs:variation>
+    <a:lumMod val="50000"/>
+    <a:lumOff val="50000"/>
+  </cs:variation>
+</cs:colorStyle>
+</file>
+
+<file path=ppt/charts/style1.xml><?xml version="1.0" encoding="utf-8"?>
+<cs:chartStyle xmlns:cs="http://schemas.microsoft.com/office/drawing/2012/chartStyle" xmlns:a="http://schemas.openxmlformats.org/drawingml/2006/main" id="201">
+  <cs:axisTitle>
+    <cs:lnRef idx="0"/>
+    <cs:fillRef idx="0"/>
+    <cs:effectRef idx="0"/>
+    <cs:fontRef idx="minor">
+      <a:schemeClr val="tx1">
+        <a:lumMod val="65000"/>
+        <a:lumOff val="35000"/>
+      </a:schemeClr>
+    </cs:fontRef>
+    <cs:defRPr sz="1330" kern="1200"/>
+  </cs:axisTitle>
+  <cs:categoryAxis>
+    <cs:lnRef idx="0"/>
+    <cs:fillRef idx="0"/>
+    <cs:effectRef idx="0"/>
+    <cs:fontRef idx="minor">
+      <a:schemeClr val="tx1">
+        <a:lumMod val="65000"/>
+        <a:lumOff val="35000"/>
+      </a:schemeClr>
+    </cs:fontRef>
+    <cs:spPr>
+      <a:ln w="9525" cap="flat" cmpd="sng" algn="ctr">
+        <a:solidFill>
+          <a:schemeClr val="tx1">
+            <a:lumMod val="15000"/>
+            <a:lumOff val="85000"/>
+          </a:schemeClr>
+        </a:solidFill>
+        <a:round/>
+      </a:ln>
+    </cs:spPr>
+    <cs:defRPr sz="1197" kern="1200"/>
+  </cs:categoryAxis>
+  <cs:chartArea mods="allowNoFillOverride allowNoLineOverride">
+    <cs:lnRef idx="0"/>
+    <cs:fillRef idx="0"/>
+    <cs:effectRef idx="0"/>
+    <cs:fontRef idx="minor">
+      <a:schemeClr val="tx1"/>
+    </cs:fontRef>
+    <cs:spPr>
+      <a:solidFill>
+        <a:schemeClr val="bg1"/>
+      </a:solidFill>
+      <a:ln w="9525" cap="flat" cmpd="sng" algn="ctr">
+        <a:solidFill>
+          <a:schemeClr val="tx1">
+            <a:lumMod val="15000"/>
+            <a:lumOff val="85000"/>
+          </a:schemeClr>
+        </a:solidFill>
+        <a:round/>
+      </a:ln>
+    </cs:spPr>
+    <cs:defRPr sz="1330" kern="1200"/>
+  </cs:chartArea>
+  <cs:dataLabel>
+    <cs:lnRef idx="0"/>
+    <cs:fillRef idx="0"/>
+    <cs:effectRef idx="0"/>
+    <cs:fontRef idx="minor">
+      <a:schemeClr val="tx1">
+        <a:lumMod val="75000"/>
+        <a:lumOff val="25000"/>
+      </a:schemeClr>
+    </cs:fontRef>
+    <cs:defRPr sz="1197" kern="1200"/>
+  </cs:dataLabel>
+  <cs:dataLabelCallout>
+    <cs:lnRef idx="0"/>
+    <cs:fillRef idx="0"/>
+    <cs:effectRef idx="0"/>
+    <cs:fontRef idx="minor">
+      <a:schemeClr val="dk1">
+        <a:lumMod val="65000"/>
+        <a:lumOff val="35000"/>
+      </a:schemeClr>
+    </cs:fontRef>
+    <cs:spPr>
+      <a:solidFill>
+        <a:schemeClr val="lt1"/>
+      </a:solidFill>
+      <a:ln>
+        <a:solidFill>
+          <a:schemeClr val="dk1">
+            <a:lumMod val="25000"/>
+            <a:lumOff val="75000"/>
+          </a:schemeClr>
+        </a:solidFill>
+      </a:ln>
+    </cs:spPr>
+    <cs:defRPr sz="1197" kern="1200"/>
+    <cs:bodyPr rot="0" spcFirstLastPara="1" vertOverflow="clip" horzOverflow="clip" vert="horz" wrap="square" lIns="36576" tIns="18288" rIns="36576" bIns="18288" anchor="ctr" anchorCtr="1">
+      <a:spAutoFit/>
+    </cs:bodyPr>
+  </cs:dataLabelCallout>
+  <cs:dataPoint>
+    <cs:lnRef idx="0"/>
+    <cs:fillRef idx="1">
+      <cs:styleClr val="auto"/>
+    </cs:fillRef>
+    <cs:effectRef idx="0"/>
+    <cs:fontRef idx="minor">
+      <a:schemeClr val="tx1"/>
+    </cs:fontRef>
+  </cs:dataPoint>
+  <cs:dataPoint3D>
+    <cs:lnRef idx="0"/>
+    <cs:fillRef idx="1">
+      <cs:styleClr val="auto"/>
+    </cs:fillRef>
+    <cs:effectRef idx="0"/>
+    <cs:fontRef idx="minor">
+      <a:schemeClr val="tx1"/>
+    </cs:fontRef>
+  </cs:dataPoint3D>
+  <cs:dataPointLine>
+    <cs:lnRef idx="0">
+      <cs:styleClr val="auto"/>
+    </cs:lnRef>
+    <cs:fillRef idx="1"/>
+    <cs:effectRef idx="0"/>
+    <cs:fontRef idx="minor">
+      <a:schemeClr val="tx1"/>
+    </cs:fontRef>
+    <cs:spPr>
+      <a:ln w="28575" cap="rnd">
+        <a:solidFill>
+          <a:schemeClr val="phClr"/>
+        </a:solidFill>
+        <a:round/>
+      </a:ln>
+    </cs:spPr>
+  </cs:dataPointLine>
+  <cs:dataPointMarker>
+    <cs:lnRef idx="0">
+      <cs:styleClr val="auto"/>
+    </cs:lnRef>
+    <cs:fillRef idx="1">
+      <cs:styleClr val="auto"/>
+    </cs:fillRef>
+    <cs:effectRef idx="0"/>
+    <cs:fontRef idx="minor">
+      <a:schemeClr val="tx1"/>
+    </cs:fontRef>
+    <cs:spPr>
+      <a:ln w="9525">
+        <a:solidFill>
+          <a:schemeClr val="phClr"/>
+        </a:solidFill>
+      </a:ln>
+    </cs:spPr>
+  </cs:dataPointMarker>
+  <cs:dataPointMarkerLayout symbol="circle" size="5"/>
+  <cs:dataPointWireframe>
+    <cs:lnRef idx="0">
+      <cs:styleClr val="auto"/>
+    </cs:lnRef>
+    <cs:fillRef idx="1"/>
+    <cs:effectRef idx="0"/>
+    <cs:fontRef idx="minor">
+      <a:schemeClr val="tx1"/>
+    </cs:fontRef>
+    <cs:spPr>
+      <a:ln w="9525" cap="rnd">
+        <a:solidFill>
+          <a:schemeClr val="phClr"/>
+        </a:solidFill>
+        <a:round/>
+      </a:ln>
+    </cs:spPr>
+  </cs:dataPointWireframe>
+  <cs:dataTable>
+    <cs:lnRef idx="0"/>
+    <cs:fillRef idx="0"/>
+    <cs:effectRef idx="0"/>
+    <cs:fontRef idx="minor">
+      <a:schemeClr val="tx1">
+        <a:lumMod val="65000"/>
+        <a:lumOff val="35000"/>
+      </a:schemeClr>
+    </cs:fontRef>
+    <cs:spPr>
+      <a:noFill/>
+      <a:ln w="9525" cap="flat" cmpd="sng" algn="ctr">
+        <a:solidFill>
+          <a:schemeClr val="tx1">
+            <a:lumMod val="15000"/>
+            <a:lumOff val="85000"/>
+          </a:schemeClr>
+        </a:solidFill>
+        <a:round/>
+      </a:ln>
+    </cs:spPr>
+    <cs:defRPr sz="1197" kern="1200"/>
+  </cs:dataTable>
+  <cs:downBar>
+    <cs:lnRef idx="0"/>
+    <cs:fillRef idx="0"/>
+    <cs:effectRef idx="0"/>
+    <cs:fontRef idx="minor">
+      <a:schemeClr val="dk1"/>
+    </cs:fontRef>
+    <cs:spPr>
+      <a:solidFill>
+        <a:schemeClr val="dk1">
+          <a:lumMod val="65000"/>
+          <a:lumOff val="35000"/>
+        </a:schemeClr>
+      </a:solidFill>
+      <a:ln w="9525">
+        <a:solidFill>
+          <a:schemeClr val="tx1">
+            <a:lumMod val="65000"/>
+            <a:lumOff val="35000"/>
+          </a:schemeClr>
+        </a:solidFill>
+      </a:ln>
+    </cs:spPr>
+  </cs:downBar>
+  <cs:dropLine>
+    <cs:lnRef idx="0"/>
+    <cs:fillRef idx="0"/>
+    <cs:effectRef idx="0"/>
+    <cs:fontRef idx="minor">
+      <a:schemeClr val="tx1"/>
+    </cs:fontRef>
+    <cs:spPr>
+      <a:ln w="9525" cap="flat" cmpd="sng" algn="ctr">
+        <a:solidFill>
+          <a:schemeClr val="tx1">
+            <a:lumMod val="35000"/>
+            <a:lumOff val="65000"/>
+          </a:schemeClr>
+        </a:solidFill>
+        <a:round/>
+      </a:ln>
+    </cs:spPr>
+  </cs:dropLine>
+  <cs:errorBar>
+    <cs:lnRef idx="0"/>
+    <cs:fillRef idx="0"/>
+    <cs:effectRef idx="0"/>
+    <cs:fontRef idx="minor">
+      <a:schemeClr val="tx1"/>
+    </cs:fontRef>
+    <cs:spPr>
+      <a:ln w="9525" cap="flat" cmpd="sng" algn="ctr">
+        <a:solidFill>
+          <a:schemeClr val="tx1">
+            <a:lumMod val="65000"/>
+            <a:lumOff val="35000"/>
+          </a:schemeClr>
+        </a:solidFill>
+        <a:round/>
+      </a:ln>
+    </cs:spPr>
+  </cs:errorBar>
+  <cs:floor>
+    <cs:lnRef idx="0"/>
+    <cs:fillRef idx="0"/>
+    <cs:effectRef idx="0"/>
+    <cs:fontRef idx="minor">
+      <a:schemeClr val="tx1"/>
+    </cs:fontRef>
+    <cs:spPr>
+      <a:noFill/>
+      <a:ln>
+        <a:noFill/>
+      </a:ln>
+    </cs:spPr>
+  </cs:floor>
+  <cs:gridlineMajor>
+    <cs:lnRef idx="0"/>
+    <cs:fillRef idx="0"/>
+    <cs:effectRef idx="0"/>
+    <cs:fontRef idx="minor">
+      <a:schemeClr val="tx1"/>
+    </cs:fontRef>
+    <cs:spPr>
+      <a:ln w="9525" cap="flat" cmpd="sng" algn="ctr">
+        <a:solidFill>
+          <a:schemeClr val="tx1">
+            <a:lumMod val="15000"/>
+            <a:lumOff val="85000"/>
+          </a:schemeClr>
+        </a:solidFill>
+        <a:round/>
+      </a:ln>
+    </cs:spPr>
+  </cs:gridlineMajor>
+  <cs:gridlineMinor>
+    <cs:lnRef idx="0"/>
+    <cs:fillRef idx="0"/>
+    <cs:effectRef idx="0"/>
+    <cs:fontRef idx="minor">
+      <a:schemeClr val="tx1"/>
+    </cs:fontRef>
+    <cs:spPr>
+      <a:ln w="9525" cap="flat" cmpd="sng" algn="ctr">
+        <a:solidFill>
+          <a:schemeClr val="tx1">
+            <a:lumMod val="5000"/>
+            <a:lumOff val="95000"/>
+          </a:schemeClr>
+        </a:solidFill>
+        <a:round/>
+      </a:ln>
+    </cs:spPr>
+  </cs:gridlineMinor>
+  <cs:hiLoLine>
+    <cs:lnRef idx="0"/>
+    <cs:fillRef idx="0"/>
+    <cs:effectRef idx="0"/>
+    <cs:fontRef idx="minor">
+      <a:schemeClr val="tx1"/>
+    </cs:fontRef>
+    <cs:spPr>
+      <a:ln w="9525" cap="flat" cmpd="sng" algn="ctr">
+        <a:solidFill>
+          <a:schemeClr val="tx1">
+            <a:lumMod val="75000"/>
+            <a:lumOff val="25000"/>
+          </a:schemeClr>
+        </a:solidFill>
+        <a:round/>
+      </a:ln>
+    </cs:spPr>
+  </cs:hiLoLine>
+  <cs:leaderLine>
+    <cs:lnRef idx="0"/>
+    <cs:fillRef idx="0"/>
+    <cs:effectRef idx="0"/>
+    <cs:fontRef idx="minor">
+      <a:schemeClr val="tx1"/>
+    </cs:fontRef>
+    <cs:spPr>
+      <a:ln w="9525" cap="flat" cmpd="sng" algn="ctr">
+        <a:solidFill>
+          <a:schemeClr val="tx1">
+            <a:lumMod val="35000"/>
+            <a:lumOff val="65000"/>
+          </a:schemeClr>
+        </a:solidFill>
+        <a:round/>
+      </a:ln>
+    </cs:spPr>
+  </cs:leaderLine>
+  <cs:legend>
+    <cs:lnRef idx="0"/>
+    <cs:fillRef idx="0"/>
+    <cs:effectRef idx="0"/>
+    <cs:fontRef idx="minor">
+      <a:schemeClr val="tx1">
+        <a:lumMod val="65000"/>
+        <a:lumOff val="35000"/>
+      </a:schemeClr>
+    </cs:fontRef>
+    <cs:defRPr sz="1197" kern="1200"/>
+  </cs:legend>
+  <cs:plotArea mods="allowNoFillOverride allowNoLineOverride">
+    <cs:lnRef idx="0"/>
+    <cs:fillRef idx="0"/>
+    <cs:effectRef idx="0"/>
+    <cs:fontRef idx="minor">
+      <a:schemeClr val="tx1"/>
+    </cs:fontRef>
+  </cs:plotArea>
+  <cs:plotArea3D mods="allowNoFillOverride allowNoLineOverride">
+    <cs:lnRef idx="0"/>
+    <cs:fillRef idx="0"/>
+    <cs:effectRef idx="0"/>
+    <cs:fontRef idx="minor">
+      <a:schemeClr val="tx1"/>
+    </cs:fontRef>
+  </cs:plotArea3D>
+  <cs:seriesAxis>
+    <cs:lnRef idx="0"/>
+    <cs:fillRef idx="0"/>
+    <cs:effectRef idx="0"/>
+    <cs:fontRef idx="minor">
+      <a:schemeClr val="tx1">
+        <a:lumMod val="65000"/>
+        <a:lumOff val="35000"/>
+      </a:schemeClr>
+    </cs:fontRef>
+    <cs:defRPr sz="1197" kern="1200"/>
+  </cs:seriesAxis>
+  <cs:seriesLine>
+    <cs:lnRef idx="0"/>
+    <cs:fillRef idx="0"/>
+    <cs:effectRef idx="0"/>
+    <cs:fontRef idx="minor">
+      <a:schemeClr val="tx1"/>
+    </cs:fontRef>
+    <cs:spPr>
+      <a:ln w="9525" cap="flat" cmpd="sng" algn="ctr">
+        <a:solidFill>
+          <a:schemeClr val="tx1">
+            <a:lumMod val="35000"/>
+            <a:lumOff val="65000"/>
+          </a:schemeClr>
+        </a:solidFill>
+        <a:round/>
+      </a:ln>
+    </cs:spPr>
+  </cs:seriesLine>
+  <cs:title>
+    <cs:lnRef idx="0"/>
+    <cs:fillRef idx="0"/>
+    <cs:effectRef idx="0"/>
+    <cs:fontRef idx="minor">
+      <a:schemeClr val="tx1">
+        <a:lumMod val="65000"/>
+        <a:lumOff val="35000"/>
+      </a:schemeClr>
+    </cs:fontRef>
+    <cs:defRPr sz="1862" b="0" kern="1200" spc="0" baseline="0"/>
+  </cs:title>
+  <cs:trendline>
+    <cs:lnRef idx="0">
+      <cs:styleClr val="auto"/>
+    </cs:lnRef>
+    <cs:fillRef idx="0"/>
+    <cs:effectRef idx="0"/>
+    <cs:fontRef idx="minor">
+      <a:schemeClr val="tx1"/>
+    </cs:fontRef>
+    <cs:spPr>
+      <a:ln w="19050" cap="rnd">
+        <a:solidFill>
+          <a:schemeClr val="phClr"/>
+        </a:solidFill>
+        <a:prstDash val="sysDot"/>
+      </a:ln>
+    </cs:spPr>
+  </cs:trendline>
+  <cs:trendlineLabel>
+    <cs:lnRef idx="0"/>
+    <cs:fillRef idx="0"/>
+    <cs:effectRef idx="0"/>
+    <cs:fontRef idx="minor">
+      <a:schemeClr val="tx1">
+        <a:lumMod val="65000"/>
+        <a:lumOff val="35000"/>
+      </a:schemeClr>
+    </cs:fontRef>
+    <cs:defRPr sz="1197" kern="1200"/>
+  </cs:trendlineLabel>
+  <cs:upBar>
+    <cs:lnRef idx="0"/>
+    <cs:fillRef idx="0"/>
+    <cs:effectRef idx="0"/>
+    <cs:fontRef idx="minor">
+      <a:schemeClr val="dk1"/>
+    </cs:fontRef>
+    <cs:spPr>
+      <a:solidFill>
+        <a:schemeClr val="lt1"/>
+      </a:solidFill>
+      <a:ln w="9525">
+        <a:solidFill>
+          <a:schemeClr val="tx1">
+            <a:lumMod val="15000"/>
+            <a:lumOff val="85000"/>
+          </a:schemeClr>
+        </a:solidFill>
+      </a:ln>
+    </cs:spPr>
+  </cs:upBar>
+  <cs:valueAxis>
+    <cs:lnRef idx="0"/>
+    <cs:fillRef idx="0"/>
+    <cs:effectRef idx="0"/>
+    <cs:fontRef idx="minor">
+      <a:schemeClr val="tx1">
+        <a:lumMod val="65000"/>
+        <a:lumOff val="35000"/>
+      </a:schemeClr>
+    </cs:fontRef>
+    <cs:defRPr sz="1197" kern="1200"/>
+  </cs:valueAxis>
+  <cs:wall>
+    <cs:lnRef idx="0"/>
+    <cs:fillRef idx="0"/>
+    <cs:effectRef idx="0"/>
+    <cs:fontRef idx="minor">
+      <a:schemeClr val="tx1"/>
+    </cs:fontRef>
+    <cs:spPr>
+      <a:noFill/>
+      <a:ln>
+        <a:noFill/>
+      </a:ln>
+    </cs:spPr>
+  </cs:wall>
+</cs:chartStyle>
+</file>
+
+<file path=ppt/charts/style2.xml><?xml version="1.0" encoding="utf-8"?>
+<cs:chartStyle xmlns:cs="http://schemas.microsoft.com/office/drawing/2012/chartStyle" xmlns:a="http://schemas.openxmlformats.org/drawingml/2006/main" id="201">
+  <cs:axisTitle>
+    <cs:lnRef idx="0"/>
+    <cs:fillRef idx="0"/>
+    <cs:effectRef idx="0"/>
+    <cs:fontRef idx="minor">
+      <a:schemeClr val="tx1">
+        <a:lumMod val="65000"/>
+        <a:lumOff val="35000"/>
+      </a:schemeClr>
+    </cs:fontRef>
+    <cs:defRPr sz="1330" kern="1200"/>
+  </cs:axisTitle>
+  <cs:categoryAxis>
+    <cs:lnRef idx="0"/>
+    <cs:fillRef idx="0"/>
+    <cs:effectRef idx="0"/>
+    <cs:fontRef idx="minor">
+      <a:schemeClr val="tx1">
+        <a:lumMod val="65000"/>
+        <a:lumOff val="35000"/>
+      </a:schemeClr>
+    </cs:fontRef>
+    <cs:spPr>
+      <a:ln w="9525" cap="flat" cmpd="sng" algn="ctr">
+        <a:solidFill>
+          <a:schemeClr val="tx1">
+            <a:lumMod val="15000"/>
+            <a:lumOff val="85000"/>
+          </a:schemeClr>
+        </a:solidFill>
+        <a:round/>
+      </a:ln>
+    </cs:spPr>
+    <cs:defRPr sz="1197" kern="1200"/>
+  </cs:categoryAxis>
+  <cs:chartArea mods="allowNoFillOverride allowNoLineOverride">
+    <cs:lnRef idx="0"/>
+    <cs:fillRef idx="0"/>
+    <cs:effectRef idx="0"/>
+    <cs:fontRef idx="minor">
+      <a:schemeClr val="tx1"/>
+    </cs:fontRef>
+    <cs:spPr>
+      <a:solidFill>
+        <a:schemeClr val="bg1"/>
+      </a:solidFill>
+      <a:ln w="9525" cap="flat" cmpd="sng" algn="ctr">
+        <a:solidFill>
+          <a:schemeClr val="tx1">
+            <a:lumMod val="15000"/>
+            <a:lumOff val="85000"/>
+          </a:schemeClr>
+        </a:solidFill>
+        <a:round/>
+      </a:ln>
+    </cs:spPr>
+    <cs:defRPr sz="1330" kern="1200"/>
+  </cs:chartArea>
+  <cs:dataLabel>
+    <cs:lnRef idx="0"/>
+    <cs:fillRef idx="0"/>
+    <cs:effectRef idx="0"/>
+    <cs:fontRef idx="minor">
+      <a:schemeClr val="tx1">
+        <a:lumMod val="75000"/>
+        <a:lumOff val="25000"/>
+      </a:schemeClr>
+    </cs:fontRef>
+    <cs:defRPr sz="1197" kern="1200"/>
+  </cs:dataLabel>
+  <cs:dataLabelCallout>
+    <cs:lnRef idx="0"/>
+    <cs:fillRef idx="0"/>
+    <cs:effectRef idx="0"/>
+    <cs:fontRef idx="minor">
+      <a:schemeClr val="dk1">
+        <a:lumMod val="65000"/>
+        <a:lumOff val="35000"/>
+      </a:schemeClr>
+    </cs:fontRef>
+    <cs:spPr>
+      <a:solidFill>
+        <a:schemeClr val="lt1"/>
+      </a:solidFill>
+      <a:ln>
+        <a:solidFill>
+          <a:schemeClr val="dk1">
+            <a:lumMod val="25000"/>
+            <a:lumOff val="75000"/>
+          </a:schemeClr>
+        </a:solidFill>
+      </a:ln>
+    </cs:spPr>
+    <cs:defRPr sz="1197" kern="1200"/>
+    <cs:bodyPr rot="0" spcFirstLastPara="1" vertOverflow="clip" horzOverflow="clip" vert="horz" wrap="square" lIns="36576" tIns="18288" rIns="36576" bIns="18288" anchor="ctr" anchorCtr="1">
+      <a:spAutoFit/>
+    </cs:bodyPr>
+  </cs:dataLabelCallout>
+  <cs:dataPoint>
+    <cs:lnRef idx="0"/>
+    <cs:fillRef idx="1">
+      <cs:styleClr val="auto"/>
+    </cs:fillRef>
+    <cs:effectRef idx="0"/>
+    <cs:fontRef idx="minor">
+      <a:schemeClr val="tx1"/>
+    </cs:fontRef>
+  </cs:dataPoint>
+  <cs:dataPoint3D>
+    <cs:lnRef idx="0"/>
+    <cs:fillRef idx="1">
+      <cs:styleClr val="auto"/>
+    </cs:fillRef>
+    <cs:effectRef idx="0"/>
+    <cs:fontRef idx="minor">
+      <a:schemeClr val="tx1"/>
+    </cs:fontRef>
+  </cs:dataPoint3D>
+  <cs:dataPointLine>
+    <cs:lnRef idx="0">
+      <cs:styleClr val="auto"/>
+    </cs:lnRef>
+    <cs:fillRef idx="1"/>
+    <cs:effectRef idx="0"/>
+    <cs:fontRef idx="minor">
+      <a:schemeClr val="tx1"/>
+    </cs:fontRef>
+    <cs:spPr>
+      <a:ln w="28575" cap="rnd">
+        <a:solidFill>
+          <a:schemeClr val="phClr"/>
+        </a:solidFill>
+        <a:round/>
+      </a:ln>
+    </cs:spPr>
+  </cs:dataPointLine>
+  <cs:dataPointMarker>
+    <cs:lnRef idx="0">
+      <cs:styleClr val="auto"/>
+    </cs:lnRef>
+    <cs:fillRef idx="1">
+      <cs:styleClr val="auto"/>
+    </cs:fillRef>
+    <cs:effectRef idx="0"/>
+    <cs:fontRef idx="minor">
+      <a:schemeClr val="tx1"/>
+    </cs:fontRef>
+    <cs:spPr>
+      <a:ln w="9525">
+        <a:solidFill>
+          <a:schemeClr val="phClr"/>
+        </a:solidFill>
+      </a:ln>
+    </cs:spPr>
+  </cs:dataPointMarker>
+  <cs:dataPointMarkerLayout symbol="circle" size="5"/>
+  <cs:dataPointWireframe>
+    <cs:lnRef idx="0">
+      <cs:styleClr val="auto"/>
+    </cs:lnRef>
+    <cs:fillRef idx="1"/>
+    <cs:effectRef idx="0"/>
+    <cs:fontRef idx="minor">
+      <a:schemeClr val="tx1"/>
+    </cs:fontRef>
+    <cs:spPr>
+      <a:ln w="9525" cap="rnd">
+        <a:solidFill>
+          <a:schemeClr val="phClr"/>
+        </a:solidFill>
+        <a:round/>
+      </a:ln>
+    </cs:spPr>
+  </cs:dataPointWireframe>
+  <cs:dataTable>
+    <cs:lnRef idx="0"/>
+    <cs:fillRef idx="0"/>
+    <cs:effectRef idx="0"/>
+    <cs:fontRef idx="minor">
+      <a:schemeClr val="tx1">
+        <a:lumMod val="65000"/>
+        <a:lumOff val="35000"/>
+      </a:schemeClr>
+    </cs:fontRef>
+    <cs:spPr>
+      <a:noFill/>
+      <a:ln w="9525" cap="flat" cmpd="sng" algn="ctr">
+        <a:solidFill>
+          <a:schemeClr val="tx1">
+            <a:lumMod val="15000"/>
+            <a:lumOff val="85000"/>
+          </a:schemeClr>
+        </a:solidFill>
+        <a:round/>
+      </a:ln>
+    </cs:spPr>
+    <cs:defRPr sz="1197" kern="1200"/>
+  </cs:dataTable>
+  <cs:downBar>
+    <cs:lnRef idx="0"/>
+    <cs:fillRef idx="0"/>
+    <cs:effectRef idx="0"/>
+    <cs:fontRef idx="minor">
+      <a:schemeClr val="dk1"/>
+    </cs:fontRef>
+    <cs:spPr>
+      <a:solidFill>
+        <a:schemeClr val="dk1">
+          <a:lumMod val="65000"/>
+          <a:lumOff val="35000"/>
+        </a:schemeClr>
+      </a:solidFill>
+      <a:ln w="9525">
+        <a:solidFill>
+          <a:schemeClr val="tx1">
+            <a:lumMod val="65000"/>
+            <a:lumOff val="35000"/>
+          </a:schemeClr>
+        </a:solidFill>
+      </a:ln>
+    </cs:spPr>
+  </cs:downBar>
+  <cs:dropLine>
+    <cs:lnRef idx="0"/>
+    <cs:fillRef idx="0"/>
+    <cs:effectRef idx="0"/>
+    <cs:fontRef idx="minor">
+      <a:schemeClr val="tx1"/>
+    </cs:fontRef>
+    <cs:spPr>
+      <a:ln w="9525" cap="flat" cmpd="sng" algn="ctr">
+        <a:solidFill>
+          <a:schemeClr val="tx1">
+            <a:lumMod val="35000"/>
+            <a:lumOff val="65000"/>
+          </a:schemeClr>
+        </a:solidFill>
+        <a:round/>
+      </a:ln>
+    </cs:spPr>
+  </cs:dropLine>
+  <cs:errorBar>
+    <cs:lnRef idx="0"/>
+    <cs:fillRef idx="0"/>
+    <cs:effectRef idx="0"/>
+    <cs:fontRef idx="minor">
+      <a:schemeClr val="tx1"/>
+    </cs:fontRef>
+    <cs:spPr>
+      <a:ln w="9525" cap="flat" cmpd="sng" algn="ctr">
+        <a:solidFill>
+          <a:schemeClr val="tx1">
+            <a:lumMod val="65000"/>
+            <a:lumOff val="35000"/>
+          </a:schemeClr>
+        </a:solidFill>
+        <a:round/>
+      </a:ln>
+    </cs:spPr>
+  </cs:errorBar>
+  <cs:floor>
+    <cs:lnRef idx="0"/>
+    <cs:fillRef idx="0"/>
+    <cs:effectRef idx="0"/>
+    <cs:fontRef idx="minor">
+      <a:schemeClr val="tx1"/>
+    </cs:fontRef>
+    <cs:spPr>
+      <a:noFill/>
+      <a:ln>
+        <a:noFill/>
+      </a:ln>
+    </cs:spPr>
+  </cs:floor>
+  <cs:gridlineMajor>
+    <cs:lnRef idx="0"/>
+    <cs:fillRef idx="0"/>
+    <cs:effectRef idx="0"/>
+    <cs:fontRef idx="minor">
+      <a:schemeClr val="tx1"/>
+    </cs:fontRef>
+    <cs:spPr>
+      <a:ln w="9525" cap="flat" cmpd="sng" algn="ctr">
+        <a:solidFill>
+          <a:schemeClr val="tx1">
+            <a:lumMod val="15000"/>
+            <a:lumOff val="85000"/>
+          </a:schemeClr>
+        </a:solidFill>
+        <a:round/>
+      </a:ln>
+    </cs:spPr>
+  </cs:gridlineMajor>
+  <cs:gridlineMinor>
+    <cs:lnRef idx="0"/>
+    <cs:fillRef idx="0"/>
+    <cs:effectRef idx="0"/>
+    <cs:fontRef idx="minor">
+      <a:schemeClr val="tx1"/>
+    </cs:fontRef>
+    <cs:spPr>
+      <a:ln w="9525" cap="flat" cmpd="sng" algn="ctr">
+        <a:solidFill>
+          <a:schemeClr val="tx1">
+            <a:lumMod val="5000"/>
+            <a:lumOff val="95000"/>
+          </a:schemeClr>
+        </a:solidFill>
+        <a:round/>
+      </a:ln>
+    </cs:spPr>
+  </cs:gridlineMinor>
+  <cs:hiLoLine>
+    <cs:lnRef idx="0"/>
+    <cs:fillRef idx="0"/>
+    <cs:effectRef idx="0"/>
+    <cs:fontRef idx="minor">
+      <a:schemeClr val="tx1"/>
+    </cs:fontRef>
+    <cs:spPr>
+      <a:ln w="9525" cap="flat" cmpd="sng" algn="ctr">
+        <a:solidFill>
+          <a:schemeClr val="tx1">
+            <a:lumMod val="75000"/>
+            <a:lumOff val="25000"/>
+          </a:schemeClr>
+        </a:solidFill>
+        <a:round/>
+      </a:ln>
+    </cs:spPr>
+  </cs:hiLoLine>
+  <cs:leaderLine>
+    <cs:lnRef idx="0"/>
+    <cs:fillRef idx="0"/>
+    <cs:effectRef idx="0"/>
+    <cs:fontRef idx="minor">
+      <a:schemeClr val="tx1"/>
+    </cs:fontRef>
+    <cs:spPr>
+      <a:ln w="9525" cap="flat" cmpd="sng" algn="ctr">
+        <a:solidFill>
+          <a:schemeClr val="tx1">
+            <a:lumMod val="35000"/>
+            <a:lumOff val="65000"/>
+          </a:schemeClr>
+        </a:solidFill>
+        <a:round/>
+      </a:ln>
+    </cs:spPr>
+  </cs:leaderLine>
+  <cs:legend>
+    <cs:lnRef idx="0"/>
+    <cs:fillRef idx="0"/>
+    <cs:effectRef idx="0"/>
+    <cs:fontRef idx="minor">
+      <a:schemeClr val="tx1">
+        <a:lumMod val="65000"/>
+        <a:lumOff val="35000"/>
+      </a:schemeClr>
+    </cs:fontRef>
+    <cs:defRPr sz="1197" kern="1200"/>
+  </cs:legend>
+  <cs:plotArea mods="allowNoFillOverride allowNoLineOverride">
+    <cs:lnRef idx="0"/>
+    <cs:fillRef idx="0"/>
+    <cs:effectRef idx="0"/>
+    <cs:fontRef idx="minor">
+      <a:schemeClr val="tx1"/>
+    </cs:fontRef>
+  </cs:plotArea>
+  <cs:plotArea3D mods="allowNoFillOverride allowNoLineOverride">
+    <cs:lnRef idx="0"/>
+    <cs:fillRef idx="0"/>
+    <cs:effectRef idx="0"/>
+    <cs:fontRef idx="minor">
+      <a:schemeClr val="tx1"/>
+    </cs:fontRef>
+  </cs:plotArea3D>
+  <cs:seriesAxis>
+    <cs:lnRef idx="0"/>
+    <cs:fillRef idx="0"/>
+    <cs:effectRef idx="0"/>
+    <cs:fontRef idx="minor">
+      <a:schemeClr val="tx1">
+        <a:lumMod val="65000"/>
+        <a:lumOff val="35000"/>
+      </a:schemeClr>
+    </cs:fontRef>
+    <cs:defRPr sz="1197" kern="1200"/>
+  </cs:seriesAxis>
+  <cs:seriesLine>
+    <cs:lnRef idx="0"/>
+    <cs:fillRef idx="0"/>
+    <cs:effectRef idx="0"/>
+    <cs:fontRef idx="minor">
+      <a:schemeClr val="tx1"/>
+    </cs:fontRef>
+    <cs:spPr>
+      <a:ln w="9525" cap="flat" cmpd="sng" algn="ctr">
+        <a:solidFill>
+          <a:schemeClr val="tx1">
+            <a:lumMod val="35000"/>
+            <a:lumOff val="65000"/>
+          </a:schemeClr>
+        </a:solidFill>
+        <a:round/>
+      </a:ln>
+    </cs:spPr>
+  </cs:seriesLine>
+  <cs:title>
+    <cs:lnRef idx="0"/>
+    <cs:fillRef idx="0"/>
+    <cs:effectRef idx="0"/>
+    <cs:fontRef idx="minor">
+      <a:schemeClr val="tx1">
+        <a:lumMod val="65000"/>
+        <a:lumOff val="35000"/>
+      </a:schemeClr>
+    </cs:fontRef>
+    <cs:defRPr sz="1862" b="0" kern="1200" spc="0" baseline="0"/>
+  </cs:title>
+  <cs:trendline>
+    <cs:lnRef idx="0">
+      <cs:styleClr val="auto"/>
+    </cs:lnRef>
+    <cs:fillRef idx="0"/>
+    <cs:effectRef idx="0"/>
+    <cs:fontRef idx="minor">
+      <a:schemeClr val="tx1"/>
+    </cs:fontRef>
+    <cs:spPr>
+      <a:ln w="19050" cap="rnd">
+        <a:solidFill>
+          <a:schemeClr val="phClr"/>
+        </a:solidFill>
+        <a:prstDash val="sysDot"/>
+      </a:ln>
+    </cs:spPr>
+  </cs:trendline>
+  <cs:trendlineLabel>
+    <cs:lnRef idx="0"/>
+    <cs:fillRef idx="0"/>
+    <cs:effectRef idx="0"/>
+    <cs:fontRef idx="minor">
+      <a:schemeClr val="tx1">
+        <a:lumMod val="65000"/>
+        <a:lumOff val="35000"/>
+      </a:schemeClr>
+    </cs:fontRef>
+    <cs:defRPr sz="1197" kern="1200"/>
+  </cs:trendlineLabel>
+  <cs:upBar>
+    <cs:lnRef idx="0"/>
+    <cs:fillRef idx="0"/>
+    <cs:effectRef idx="0"/>
+    <cs:fontRef idx="minor">
+      <a:schemeClr val="dk1"/>
+    </cs:fontRef>
+    <cs:spPr>
+      <a:solidFill>
+        <a:schemeClr val="lt1"/>
+      </a:solidFill>
+      <a:ln w="9525">
+        <a:solidFill>
+          <a:schemeClr val="tx1">
+            <a:lumMod val="15000"/>
+            <a:lumOff val="85000"/>
+          </a:schemeClr>
+        </a:solidFill>
+      </a:ln>
+    </cs:spPr>
+  </cs:upBar>
+  <cs:valueAxis>
+    <cs:lnRef idx="0"/>
+    <cs:fillRef idx="0"/>
+    <cs:effectRef idx="0"/>
+    <cs:fontRef idx="minor">
+      <a:schemeClr val="tx1">
+        <a:lumMod val="65000"/>
+        <a:lumOff val="35000"/>
+      </a:schemeClr>
+    </cs:fontRef>
+    <cs:defRPr sz="1197" kern="1200"/>
+  </cs:valueAxis>
+  <cs:wall>
+    <cs:lnRef idx="0"/>
+    <cs:fillRef idx="0"/>
+    <cs:effectRef idx="0"/>
+    <cs:fontRef idx="minor">
+      <a:schemeClr val="tx1"/>
+    </cs:fontRef>
+    <cs:spPr>
+      <a:noFill/>
+      <a:ln>
+        <a:noFill/>
+      </a:ln>
+    </cs:spPr>
+  </cs:wall>
+</cs:chartStyle>
 </file>
 
 <file path=ppt/notesMasters/notesMaster1.xml><?xml version="1.0" encoding="utf-8"?>
@@ -32609,77 +34971,37 @@
           <a:p>
             <a:r>
               <a:rPr lang="en-US" dirty="0"/>
-              <a:t>Lock-Free Algorithms – Lessons Learned</a:t>
-            </a:r>
-          </a:p>
-        </p:txBody>
-      </p:sp>
-      <p:sp>
-        <p:nvSpPr>
-          <p:cNvPr id="8" name="Content Placeholder 7"/>
-          <p:cNvSpPr>
-            <a:spLocks noGrp="1"/>
-          </p:cNvSpPr>
+              <a:t>Lock-Free Dictionary Read Performance</a:t>
+            </a:r>
+            <a:endParaRPr lang="de-DE" dirty="0"/>
+          </a:p>
+        </p:txBody>
+      </p:sp>
+      <p:graphicFrame>
+        <p:nvGraphicFramePr>
+          <p:cNvPr id="11" name="Content Placeholder 10"/>
+          <p:cNvGraphicFramePr>
+            <a:graphicFrameLocks noGrp="1"/>
+          </p:cNvGraphicFramePr>
           <p:nvPr>
             <p:ph idx="1"/>
-          </p:nvPr>
-        </p:nvSpPr>
-        <p:spPr/>
-        <p:txBody>
-          <a:bodyPr/>
-          <a:lstStyle/>
-          <a:p>
-            <a:r>
-              <a:rPr lang="de-DE" dirty="0"/>
-              <a:t>Finde alle </a:t>
-            </a:r>
-            <a:r>
-              <a:rPr lang="de-DE" dirty="0" err="1"/>
-              <a:t>Race</a:t>
-            </a:r>
-            <a:r>
-              <a:rPr lang="de-DE" dirty="0"/>
-              <a:t> </a:t>
-            </a:r>
-            <a:r>
-              <a:rPr lang="de-DE" dirty="0" err="1"/>
-              <a:t>Conditions</a:t>
-            </a:r>
-            <a:endParaRPr lang="de-DE" dirty="0"/>
-          </a:p>
-          <a:p>
-            <a:r>
-              <a:rPr lang="de-DE" dirty="0"/>
-              <a:t>Gegen </a:t>
-            </a:r>
-            <a:r>
-              <a:rPr lang="de-DE" dirty="0" err="1"/>
-              <a:t>Heisenbugs</a:t>
-            </a:r>
-            <a:r>
-              <a:rPr lang="de-DE" dirty="0"/>
-              <a:t> hilft nur Lock-Free </a:t>
-            </a:r>
-            <a:r>
-              <a:rPr lang="de-DE" dirty="0" err="1"/>
-              <a:t>Logging</a:t>
-            </a:r>
-            <a:endParaRPr lang="de-DE" dirty="0"/>
-          </a:p>
-          <a:p>
-            <a:r>
-              <a:rPr lang="de-DE" dirty="0"/>
-              <a:t>Bei nicht-atomaren Operationen kann es hilfreich sein, wenn alle (beteiligten) Threads mithelfen</a:t>
-            </a:r>
-          </a:p>
-          <a:p>
-            <a:r>
-              <a:rPr lang="de-DE" dirty="0"/>
-              <a:t>Performancevorteil? Messen!</a:t>
-            </a:r>
-          </a:p>
-        </p:txBody>
-      </p:sp>
+            <p:extLst>
+              <p:ext uri="{D42A27DB-BD31-4B8C-83A1-F6EECF244321}">
+                <p14:modId xmlns:p14="http://schemas.microsoft.com/office/powerpoint/2010/main" val="3727464362"/>
+              </p:ext>
+            </p:extLst>
+          </p:nvPr>
+        </p:nvGraphicFramePr>
+        <p:xfrm>
+          <a:off x="838200" y="1825625"/>
+          <a:ext cx="10515600" cy="4351338"/>
+        </p:xfrm>
+        <a:graphic>
+          <a:graphicData uri="http://schemas.openxmlformats.org/drawingml/2006/chart">
+            <c:chart xmlns:c="http://schemas.openxmlformats.org/drawingml/2006/chart" xmlns:r="http://schemas.openxmlformats.org/officeDocument/2006/relationships" r:id="rId2"/>
+          </a:graphicData>
+        </a:graphic>
+      </p:graphicFrame>
       <p:sp>
         <p:nvSpPr>
           <p:cNvPr id="4" name="Date Placeholder 3"/>
@@ -32750,7 +35072,7 @@
     </p:spTree>
     <p:extLst>
       <p:ext uri="{BB962C8B-B14F-4D97-AF65-F5344CB8AC3E}">
-        <p14:creationId xmlns:p14="http://schemas.microsoft.com/office/powerpoint/2010/main" val="3948633100"/>
+        <p14:creationId xmlns:p14="http://schemas.microsoft.com/office/powerpoint/2010/main" val="155217772"/>
       </p:ext>
     </p:extLst>
   </p:cSld>
@@ -32796,123 +35118,38 @@
           <a:lstStyle/>
           <a:p>
             <a:r>
-              <a:rPr lang="de-DE" dirty="0"/>
-              <a:t>Zusammenfassend</a:t>
-            </a:r>
-          </a:p>
-        </p:txBody>
-      </p:sp>
-      <p:sp>
-        <p:nvSpPr>
-          <p:cNvPr id="3" name="Content Placeholder 2"/>
-          <p:cNvSpPr>
-            <a:spLocks noGrp="1"/>
-          </p:cNvSpPr>
+              <a:rPr lang="en-US" dirty="0"/>
+              <a:t>Lock-Free Dictionary Write Performance</a:t>
+            </a:r>
+            <a:endParaRPr lang="de-DE" dirty="0"/>
+          </a:p>
+        </p:txBody>
+      </p:sp>
+      <p:graphicFrame>
+        <p:nvGraphicFramePr>
+          <p:cNvPr id="9" name="Content Placeholder 8"/>
+          <p:cNvGraphicFramePr>
+            <a:graphicFrameLocks noGrp="1"/>
+          </p:cNvGraphicFramePr>
           <p:nvPr>
             <p:ph idx="1"/>
-          </p:nvPr>
-        </p:nvSpPr>
-        <p:spPr/>
-        <p:txBody>
-          <a:bodyPr/>
-          <a:lstStyle/>
-          <a:p>
-            <a:r>
-              <a:rPr lang="de-DE" dirty="0"/>
-              <a:t>Thread Pool Threads nicht blockieren</a:t>
-            </a:r>
-          </a:p>
-          <a:p>
-            <a:r>
-              <a:rPr lang="de-DE" dirty="0"/>
-              <a:t>I/O Devices asynchron ansprechen </a:t>
-            </a:r>
-            <a:br>
-              <a:rPr lang="de-DE" dirty="0"/>
-            </a:br>
-            <a:r>
-              <a:rPr lang="de-DE" dirty="0"/>
-              <a:t>(</a:t>
-            </a:r>
-            <a:r>
-              <a:rPr lang="de-DE" dirty="0" err="1">
-                <a:solidFill>
-                  <a:srgbClr val="0000FF"/>
-                </a:solidFill>
-                <a:latin typeface="Consolas" panose="020B0609020204030204" pitchFamily="49" charset="0"/>
-              </a:rPr>
-              <a:t>async</a:t>
-            </a:r>
-            <a:r>
-              <a:rPr lang="de-DE" dirty="0">
-                <a:solidFill>
-                  <a:srgbClr val="0000FF"/>
-                </a:solidFill>
-                <a:latin typeface="Consolas" panose="020B0609020204030204" pitchFamily="49" charset="0"/>
-              </a:rPr>
-              <a:t> </a:t>
-            </a:r>
-            <a:r>
-              <a:rPr lang="de-DE" dirty="0" err="1">
-                <a:solidFill>
-                  <a:srgbClr val="0000FF"/>
-                </a:solidFill>
-                <a:latin typeface="Consolas" panose="020B0609020204030204" pitchFamily="49" charset="0"/>
-              </a:rPr>
-              <a:t>await</a:t>
-            </a:r>
-            <a:r>
-              <a:rPr lang="de-DE" dirty="0"/>
-              <a:t> ist dein Freund)</a:t>
-            </a:r>
-          </a:p>
-          <a:p>
-            <a:r>
-              <a:rPr lang="de-DE" dirty="0"/>
-              <a:t>Lange Operationen innerhalb eines </a:t>
-            </a:r>
-            <a:r>
-              <a:rPr lang="de-DE" dirty="0">
-                <a:solidFill>
-                  <a:srgbClr val="0000FF"/>
-                </a:solidFill>
-                <a:latin typeface="Consolas" panose="020B0609020204030204" pitchFamily="49" charset="0"/>
-              </a:rPr>
-              <a:t>lock</a:t>
-            </a:r>
-            <a:r>
-              <a:rPr lang="de-DE" dirty="0"/>
-              <a:t> vermeiden – hilft hier vielleicht </a:t>
-            </a:r>
-            <a:r>
-              <a:rPr lang="de-DE" dirty="0">
-                <a:solidFill>
-                  <a:srgbClr val="2D91AF"/>
-                </a:solidFill>
-                <a:latin typeface="Consolas" panose="020B0609020204030204" pitchFamily="49" charset="0"/>
-              </a:rPr>
-              <a:t>Volatile</a:t>
-            </a:r>
-            <a:r>
-              <a:rPr lang="de-DE" dirty="0"/>
-              <a:t> oder </a:t>
-            </a:r>
-            <a:r>
-              <a:rPr lang="de-DE" dirty="0" err="1">
-                <a:solidFill>
-                  <a:srgbClr val="2D91AF"/>
-                </a:solidFill>
-                <a:latin typeface="Consolas" panose="020B0609020204030204" pitchFamily="49" charset="0"/>
-              </a:rPr>
-              <a:t>Interlocked</a:t>
-            </a:r>
-            <a:r>
-              <a:rPr lang="de-DE" dirty="0"/>
-              <a:t> weiter?</a:t>
-            </a:r>
-          </a:p>
-        </p:txBody>
-      </p:sp>
+            <p:extLst>
+              <p:ext uri="{D42A27DB-BD31-4B8C-83A1-F6EECF244321}">
+                <p14:modId xmlns:p14="http://schemas.microsoft.com/office/powerpoint/2010/main" val="2036430025"/>
+              </p:ext>
+            </p:extLst>
+          </p:nvPr>
+        </p:nvGraphicFramePr>
+        <p:xfrm>
+          <a:off x="838200" y="1825625"/>
+          <a:ext cx="10515600" cy="4351338"/>
+        </p:xfrm>
+        <a:graphic>
+          <a:graphicData uri="http://schemas.openxmlformats.org/drawingml/2006/chart">
+            <c:chart xmlns:c="http://schemas.openxmlformats.org/drawingml/2006/chart" xmlns:r="http://schemas.openxmlformats.org/officeDocument/2006/relationships" r:id="rId2"/>
+          </a:graphicData>
+        </a:graphic>
+      </p:graphicFrame>
       <p:sp>
         <p:nvSpPr>
           <p:cNvPr id="4" name="Date Placeholder 3"/>
@@ -32983,7 +35220,7 @@
     </p:spTree>
     <p:extLst>
       <p:ext uri="{BB962C8B-B14F-4D97-AF65-F5344CB8AC3E}">
-        <p14:creationId xmlns:p14="http://schemas.microsoft.com/office/powerpoint/2010/main" val="1453042621"/>
+        <p14:creationId xmlns:p14="http://schemas.microsoft.com/office/powerpoint/2010/main" val="2284105447"/>
       </p:ext>
     </p:extLst>
   </p:cSld>
@@ -33015,7 +35252,7 @@
       </p:grpSpPr>
       <p:sp>
         <p:nvSpPr>
-          <p:cNvPr id="2" name="Title 1"/>
+          <p:cNvPr id="7" name="Title 6"/>
           <p:cNvSpPr>
             <a:spLocks noGrp="1"/>
           </p:cNvSpPr>
@@ -33029,15 +35266,15 @@
           <a:lstStyle/>
           <a:p>
             <a:r>
-              <a:rPr lang="de-DE" dirty="0"/>
-              <a:t>Quellen:</a:t>
-            </a:r>
-          </a:p>
-        </p:txBody>
-      </p:sp>
-      <p:sp>
-        <p:nvSpPr>
-          <p:cNvPr id="3" name="Content Placeholder 2"/>
+              <a:rPr lang="en-US" dirty="0"/>
+              <a:t>Lock-Free Algorithms – Lessons Learned</a:t>
+            </a:r>
+          </a:p>
+        </p:txBody>
+      </p:sp>
+      <p:sp>
+        <p:nvSpPr>
+          <p:cNvPr id="8" name="Content Placeholder 7"/>
           <p:cNvSpPr>
             <a:spLocks noGrp="1"/>
           </p:cNvSpPr>
@@ -33047,152 +35284,57 @@
         </p:nvSpPr>
         <p:spPr/>
         <p:txBody>
-          <a:bodyPr>
-            <a:normAutofit/>
-          </a:bodyPr>
+          <a:bodyPr/>
           <a:lstStyle/>
           <a:p>
             <a:r>
               <a:rPr lang="de-DE" dirty="0"/>
-              <a:t>Jeffrey Richter – </a:t>
+              <a:t>Finde alle </a:t>
             </a:r>
             <a:r>
               <a:rPr lang="de-DE" dirty="0" err="1"/>
-              <a:t>Advanced</a:t>
-            </a:r>
-            <a:r>
-              <a:rPr lang="de-DE" dirty="0"/>
-              <a:t> .NET Threading:</a:t>
-            </a:r>
-            <a:br>
-              <a:rPr lang="de-DE" dirty="0"/>
-            </a:br>
-            <a:r>
-              <a:rPr lang="de-DE" dirty="0">
-                <a:hlinkClick r:id="rId2"/>
-              </a:rPr>
-              <a:t>Part 1</a:t>
+              <a:t>Race</a:t>
             </a:r>
             <a:r>
               <a:rPr lang="de-DE" dirty="0"/>
               <a:t> </a:t>
             </a:r>
             <a:r>
-              <a:rPr lang="de-DE" dirty="0">
-                <a:hlinkClick r:id="rId3"/>
-              </a:rPr>
-              <a:t>Part 2</a:t>
-            </a:r>
+              <a:rPr lang="de-DE" dirty="0" err="1"/>
+              <a:t>Conditions</a:t>
+            </a:r>
+            <a:endParaRPr lang="de-DE" dirty="0"/>
+          </a:p>
+          <a:p>
             <a:r>
               <a:rPr lang="de-DE" dirty="0"/>
-              <a:t> </a:t>
-            </a:r>
-            <a:r>
-              <a:rPr lang="de-DE" dirty="0">
-                <a:hlinkClick r:id="rId4"/>
-              </a:rPr>
-              <a:t>Part 3</a:t>
+              <a:t>Gegen </a:t>
+            </a:r>
+            <a:r>
+              <a:rPr lang="de-DE" dirty="0" err="1"/>
+              <a:t>Heisenbugs</a:t>
             </a:r>
             <a:r>
               <a:rPr lang="de-DE" dirty="0"/>
-              <a:t> </a:t>
-            </a:r>
-            <a:r>
-              <a:rPr lang="de-DE" dirty="0">
-                <a:hlinkClick r:id="rId5"/>
-              </a:rPr>
-              <a:t>Part 4</a:t>
-            </a:r>
+              <a:t> hilft nur Lock-Free </a:t>
+            </a:r>
+            <a:r>
+              <a:rPr lang="de-DE" dirty="0" err="1"/>
+              <a:t>Logging</a:t>
+            </a:r>
+            <a:endParaRPr lang="de-DE" dirty="0"/>
+          </a:p>
+          <a:p>
             <a:r>
               <a:rPr lang="de-DE" dirty="0"/>
-              <a:t> </a:t>
-            </a:r>
-            <a:r>
-              <a:rPr lang="de-DE" dirty="0">
-                <a:hlinkClick r:id="rId6"/>
-              </a:rPr>
-              <a:t>Part 5</a:t>
-            </a:r>
-            <a:endParaRPr lang="de-DE" dirty="0"/>
+              <a:t>Bei nicht-atomaren Operationen kann es hilfreich sein, wenn alle (beteiligten) Threads mithelfen</a:t>
+            </a:r>
           </a:p>
           <a:p>
             <a:r>
               <a:rPr lang="de-DE" dirty="0"/>
-              <a:t>Joseph </a:t>
-            </a:r>
-            <a:r>
-              <a:rPr lang="de-DE" dirty="0" err="1"/>
-              <a:t>Albahari</a:t>
-            </a:r>
-            <a:r>
-              <a:rPr lang="de-DE" dirty="0"/>
-              <a:t> – Threading in .NET</a:t>
-            </a:r>
-            <a:br>
-              <a:rPr lang="de-DE" dirty="0"/>
-            </a:br>
-            <a:r>
-              <a:rPr lang="de-DE" dirty="0">
-                <a:hlinkClick r:id="rId7"/>
-              </a:rPr>
-              <a:t>http://www.albahari.com/threading/</a:t>
-            </a:r>
-            <a:endParaRPr lang="de-DE" dirty="0"/>
-          </a:p>
-          <a:p>
-            <a:r>
-              <a:rPr lang="de-DE" dirty="0"/>
-              <a:t>Jon Skeet – </a:t>
-            </a:r>
-            <a:r>
-              <a:rPr lang="de-DE" dirty="0" err="1"/>
-              <a:t>Asynchronous</a:t>
-            </a:r>
-            <a:r>
-              <a:rPr lang="de-DE" dirty="0"/>
-              <a:t> C# 5.0</a:t>
-            </a:r>
-            <a:br>
-              <a:rPr lang="de-DE" dirty="0"/>
-            </a:br>
-            <a:r>
-              <a:rPr lang="en-GB" u="sng" dirty="0">
-                <a:hlinkClick r:id="rId8"/>
-              </a:rPr>
-              <a:t>Pluralsight Course on Asynchronous C# 5.0</a:t>
-            </a:r>
-            <a:endParaRPr lang="en-GB" u="sng" dirty="0"/>
-          </a:p>
-          <a:p>
-            <a:r>
-              <a:rPr lang="de-DE" dirty="0"/>
-              <a:t>Cliff Click – A Non-</a:t>
-            </a:r>
-            <a:r>
-              <a:rPr lang="de-DE" dirty="0" err="1"/>
-              <a:t>Blocking</a:t>
-            </a:r>
-            <a:r>
-              <a:rPr lang="de-DE" dirty="0"/>
-              <a:t> </a:t>
-            </a:r>
-            <a:r>
-              <a:rPr lang="de-DE" dirty="0" err="1"/>
-              <a:t>HashTable</a:t>
-            </a:r>
-            <a:br>
-              <a:rPr lang="de-DE" dirty="0"/>
-            </a:br>
-            <a:r>
-              <a:rPr lang="x-none" dirty="0">
-                <a:hlinkClick r:id="rId9"/>
-              </a:rPr>
-              <a:t>http://www.cliffc.org/blog/2007/03/26/non-blocking-hashtable/</a:t>
-            </a:r>
-            <a:br>
-              <a:rPr lang="de-DE" dirty="0"/>
-            </a:br>
-            <a:endParaRPr lang="de-DE" dirty="0"/>
+              <a:t>Performancevorteil? Messen!</a:t>
+            </a:r>
           </a:p>
         </p:txBody>
       </p:sp>
@@ -33266,7 +35408,7 @@
     </p:spTree>
     <p:extLst>
       <p:ext uri="{BB962C8B-B14F-4D97-AF65-F5344CB8AC3E}">
-        <p14:creationId xmlns:p14="http://schemas.microsoft.com/office/powerpoint/2010/main" val="1617267930"/>
+        <p14:creationId xmlns:p14="http://schemas.microsoft.com/office/powerpoint/2010/main" val="3948633100"/>
       </p:ext>
     </p:extLst>
   </p:cSld>
@@ -33298,6 +35440,522 @@
       </p:grpSpPr>
       <p:sp>
         <p:nvSpPr>
+          <p:cNvPr id="2" name="Title 1"/>
+          <p:cNvSpPr>
+            <a:spLocks noGrp="1"/>
+          </p:cNvSpPr>
+          <p:nvPr>
+            <p:ph type="title"/>
+          </p:nvPr>
+        </p:nvSpPr>
+        <p:spPr/>
+        <p:txBody>
+          <a:bodyPr/>
+          <a:lstStyle/>
+          <a:p>
+            <a:r>
+              <a:rPr lang="de-DE" dirty="0"/>
+              <a:t>Zusammenfassend</a:t>
+            </a:r>
+          </a:p>
+        </p:txBody>
+      </p:sp>
+      <p:sp>
+        <p:nvSpPr>
+          <p:cNvPr id="3" name="Content Placeholder 2"/>
+          <p:cNvSpPr>
+            <a:spLocks noGrp="1"/>
+          </p:cNvSpPr>
+          <p:nvPr>
+            <p:ph idx="1"/>
+          </p:nvPr>
+        </p:nvSpPr>
+        <p:spPr/>
+        <p:txBody>
+          <a:bodyPr/>
+          <a:lstStyle/>
+          <a:p>
+            <a:r>
+              <a:rPr lang="de-DE" dirty="0"/>
+              <a:t>Thread Pool Threads nicht blockieren</a:t>
+            </a:r>
+          </a:p>
+          <a:p>
+            <a:r>
+              <a:rPr lang="de-DE" dirty="0"/>
+              <a:t>I/O Devices asynchron ansprechen </a:t>
+            </a:r>
+            <a:br>
+              <a:rPr lang="de-DE" dirty="0"/>
+            </a:br>
+            <a:r>
+              <a:rPr lang="de-DE" dirty="0"/>
+              <a:t>(</a:t>
+            </a:r>
+            <a:r>
+              <a:rPr lang="de-DE" dirty="0" err="1">
+                <a:solidFill>
+                  <a:srgbClr val="0000FF"/>
+                </a:solidFill>
+                <a:latin typeface="Consolas" panose="020B0609020204030204" pitchFamily="49" charset="0"/>
+              </a:rPr>
+              <a:t>async</a:t>
+            </a:r>
+            <a:r>
+              <a:rPr lang="de-DE" dirty="0">
+                <a:solidFill>
+                  <a:srgbClr val="0000FF"/>
+                </a:solidFill>
+                <a:latin typeface="Consolas" panose="020B0609020204030204" pitchFamily="49" charset="0"/>
+              </a:rPr>
+              <a:t> </a:t>
+            </a:r>
+            <a:r>
+              <a:rPr lang="de-DE" dirty="0" err="1">
+                <a:solidFill>
+                  <a:srgbClr val="0000FF"/>
+                </a:solidFill>
+                <a:latin typeface="Consolas" panose="020B0609020204030204" pitchFamily="49" charset="0"/>
+              </a:rPr>
+              <a:t>await</a:t>
+            </a:r>
+            <a:r>
+              <a:rPr lang="de-DE" dirty="0"/>
+              <a:t> ist dein Freund)</a:t>
+            </a:r>
+          </a:p>
+          <a:p>
+            <a:r>
+              <a:rPr lang="de-DE" dirty="0"/>
+              <a:t>Lange Operationen innerhalb eines </a:t>
+            </a:r>
+            <a:r>
+              <a:rPr lang="de-DE" dirty="0">
+                <a:solidFill>
+                  <a:srgbClr val="0000FF"/>
+                </a:solidFill>
+                <a:latin typeface="Consolas" panose="020B0609020204030204" pitchFamily="49" charset="0"/>
+              </a:rPr>
+              <a:t>lock</a:t>
+            </a:r>
+            <a:r>
+              <a:rPr lang="de-DE" dirty="0"/>
+              <a:t> vermeiden – hilft hier vielleicht </a:t>
+            </a:r>
+            <a:r>
+              <a:rPr lang="de-DE" dirty="0">
+                <a:solidFill>
+                  <a:srgbClr val="2D91AF"/>
+                </a:solidFill>
+                <a:latin typeface="Consolas" panose="020B0609020204030204" pitchFamily="49" charset="0"/>
+              </a:rPr>
+              <a:t>Volatile</a:t>
+            </a:r>
+            <a:r>
+              <a:rPr lang="de-DE" dirty="0"/>
+              <a:t> oder </a:t>
+            </a:r>
+            <a:r>
+              <a:rPr lang="de-DE" dirty="0" err="1">
+                <a:solidFill>
+                  <a:srgbClr val="2D91AF"/>
+                </a:solidFill>
+                <a:latin typeface="Consolas" panose="020B0609020204030204" pitchFamily="49" charset="0"/>
+              </a:rPr>
+              <a:t>Interlocked</a:t>
+            </a:r>
+            <a:r>
+              <a:rPr lang="de-DE" dirty="0"/>
+              <a:t> weiter?</a:t>
+            </a:r>
+          </a:p>
+        </p:txBody>
+      </p:sp>
+      <p:sp>
+        <p:nvSpPr>
+          <p:cNvPr id="4" name="Date Placeholder 3"/>
+          <p:cNvSpPr>
+            <a:spLocks noGrp="1"/>
+          </p:cNvSpPr>
+          <p:nvPr>
+            <p:ph type="dt" sz="half" idx="10"/>
+          </p:nvPr>
+        </p:nvSpPr>
+        <p:spPr/>
+        <p:txBody>
+          <a:bodyPr/>
+          <a:lstStyle/>
+          <a:p>
+            <a:r>
+              <a:rPr lang="en-US"/>
+              <a:t>15.03.2017</a:t>
+            </a:r>
+          </a:p>
+        </p:txBody>
+      </p:sp>
+      <p:sp>
+        <p:nvSpPr>
+          <p:cNvPr id="5" name="Footer Placeholder 4"/>
+          <p:cNvSpPr>
+            <a:spLocks noGrp="1"/>
+          </p:cNvSpPr>
+          <p:nvPr>
+            <p:ph type="ftr" sz="quarter" idx="11"/>
+          </p:nvPr>
+        </p:nvSpPr>
+        <p:spPr/>
+        <p:txBody>
+          <a:bodyPr/>
+          <a:lstStyle/>
+          <a:p>
+            <a:r>
+              <a:rPr lang="en-US"/>
+              <a:t>.NET Threading im Detail</a:t>
+            </a:r>
+          </a:p>
+        </p:txBody>
+      </p:sp>
+      <p:sp>
+        <p:nvSpPr>
+          <p:cNvPr id="6" name="Slide Number Placeholder 5"/>
+          <p:cNvSpPr>
+            <a:spLocks noGrp="1"/>
+          </p:cNvSpPr>
+          <p:nvPr>
+            <p:ph type="sldNum" sz="quarter" idx="12"/>
+          </p:nvPr>
+        </p:nvSpPr>
+        <p:spPr/>
+        <p:txBody>
+          <a:bodyPr/>
+          <a:lstStyle/>
+          <a:p>
+            <a:fld id="{FF4FE05E-2642-448D-9FC5-15A41ACA4214}" type="slidenum">
+              <a:rPr lang="en-US" smtClean="0"/>
+              <a:t>65</a:t>
+            </a:fld>
+            <a:endParaRPr lang="en-US"/>
+          </a:p>
+        </p:txBody>
+      </p:sp>
+    </p:spTree>
+    <p:extLst>
+      <p:ext uri="{BB962C8B-B14F-4D97-AF65-F5344CB8AC3E}">
+        <p14:creationId xmlns:p14="http://schemas.microsoft.com/office/powerpoint/2010/main" val="1453042621"/>
+      </p:ext>
+    </p:extLst>
+  </p:cSld>
+  <p:clrMapOvr>
+    <a:masterClrMapping/>
+  </p:clrMapOvr>
+  <p:transition spd="med">
+    <p:cover/>
+  </p:transition>
+</p:sld>
+</file>
+
+<file path=ppt/slides/slide66.xml><?xml version="1.0" encoding="utf-8"?>
+<p:sld xmlns:a="http://schemas.openxmlformats.org/drawingml/2006/main" xmlns:r="http://schemas.openxmlformats.org/officeDocument/2006/relationships" xmlns:p="http://schemas.openxmlformats.org/presentationml/2006/main">
+  <p:cSld>
+    <p:spTree>
+      <p:nvGrpSpPr>
+        <p:cNvPr id="1" name=""/>
+        <p:cNvGrpSpPr/>
+        <p:nvPr/>
+      </p:nvGrpSpPr>
+      <p:grpSpPr>
+        <a:xfrm>
+          <a:off x="0" y="0"/>
+          <a:ext cx="0" cy="0"/>
+          <a:chOff x="0" y="0"/>
+          <a:chExt cx="0" cy="0"/>
+        </a:xfrm>
+      </p:grpSpPr>
+      <p:sp>
+        <p:nvSpPr>
+          <p:cNvPr id="2" name="Title 1"/>
+          <p:cNvSpPr>
+            <a:spLocks noGrp="1"/>
+          </p:cNvSpPr>
+          <p:nvPr>
+            <p:ph type="title"/>
+          </p:nvPr>
+        </p:nvSpPr>
+        <p:spPr/>
+        <p:txBody>
+          <a:bodyPr/>
+          <a:lstStyle/>
+          <a:p>
+            <a:r>
+              <a:rPr lang="de-DE" dirty="0"/>
+              <a:t>Quellen:</a:t>
+            </a:r>
+          </a:p>
+        </p:txBody>
+      </p:sp>
+      <p:sp>
+        <p:nvSpPr>
+          <p:cNvPr id="3" name="Content Placeholder 2"/>
+          <p:cNvSpPr>
+            <a:spLocks noGrp="1"/>
+          </p:cNvSpPr>
+          <p:nvPr>
+            <p:ph idx="1"/>
+          </p:nvPr>
+        </p:nvSpPr>
+        <p:spPr/>
+        <p:txBody>
+          <a:bodyPr>
+            <a:normAutofit/>
+          </a:bodyPr>
+          <a:lstStyle/>
+          <a:p>
+            <a:r>
+              <a:rPr lang="de-DE" dirty="0"/>
+              <a:t>Jeffrey Richter – </a:t>
+            </a:r>
+            <a:r>
+              <a:rPr lang="de-DE" dirty="0" err="1"/>
+              <a:t>Advanced</a:t>
+            </a:r>
+            <a:r>
+              <a:rPr lang="de-DE" dirty="0"/>
+              <a:t> .NET Threading:</a:t>
+            </a:r>
+            <a:br>
+              <a:rPr lang="de-DE" dirty="0"/>
+            </a:br>
+            <a:r>
+              <a:rPr lang="de-DE" dirty="0">
+                <a:hlinkClick r:id="rId2"/>
+              </a:rPr>
+              <a:t>Part 1</a:t>
+            </a:r>
+            <a:r>
+              <a:rPr lang="de-DE" dirty="0"/>
+              <a:t> </a:t>
+            </a:r>
+            <a:r>
+              <a:rPr lang="de-DE" dirty="0">
+                <a:hlinkClick r:id="rId3"/>
+              </a:rPr>
+              <a:t>Part 2</a:t>
+            </a:r>
+            <a:r>
+              <a:rPr lang="de-DE" dirty="0"/>
+              <a:t> </a:t>
+            </a:r>
+            <a:r>
+              <a:rPr lang="de-DE" dirty="0">
+                <a:hlinkClick r:id="rId4"/>
+              </a:rPr>
+              <a:t>Part 3</a:t>
+            </a:r>
+            <a:r>
+              <a:rPr lang="de-DE" dirty="0"/>
+              <a:t> </a:t>
+            </a:r>
+            <a:r>
+              <a:rPr lang="de-DE" dirty="0">
+                <a:hlinkClick r:id="rId5"/>
+              </a:rPr>
+              <a:t>Part 4</a:t>
+            </a:r>
+            <a:r>
+              <a:rPr lang="de-DE" dirty="0"/>
+              <a:t> </a:t>
+            </a:r>
+            <a:r>
+              <a:rPr lang="de-DE" dirty="0">
+                <a:hlinkClick r:id="rId6"/>
+              </a:rPr>
+              <a:t>Part 5</a:t>
+            </a:r>
+            <a:endParaRPr lang="de-DE" dirty="0"/>
+          </a:p>
+          <a:p>
+            <a:r>
+              <a:rPr lang="de-DE" dirty="0"/>
+              <a:t>Joseph </a:t>
+            </a:r>
+            <a:r>
+              <a:rPr lang="de-DE" dirty="0" err="1"/>
+              <a:t>Albahari</a:t>
+            </a:r>
+            <a:r>
+              <a:rPr lang="de-DE" dirty="0"/>
+              <a:t> – Threading in .NET</a:t>
+            </a:r>
+            <a:br>
+              <a:rPr lang="de-DE" dirty="0"/>
+            </a:br>
+            <a:r>
+              <a:rPr lang="de-DE" dirty="0">
+                <a:hlinkClick r:id="rId7"/>
+              </a:rPr>
+              <a:t>http://www.albahari.com/threading/</a:t>
+            </a:r>
+            <a:endParaRPr lang="de-DE" dirty="0"/>
+          </a:p>
+          <a:p>
+            <a:r>
+              <a:rPr lang="de-DE" dirty="0"/>
+              <a:t>Jon Skeet – </a:t>
+            </a:r>
+            <a:r>
+              <a:rPr lang="de-DE" dirty="0" err="1"/>
+              <a:t>Asynchronous</a:t>
+            </a:r>
+            <a:r>
+              <a:rPr lang="de-DE" dirty="0"/>
+              <a:t> C# 5.0</a:t>
+            </a:r>
+            <a:br>
+              <a:rPr lang="de-DE" dirty="0"/>
+            </a:br>
+            <a:r>
+              <a:rPr lang="en-GB" u="sng" dirty="0">
+                <a:hlinkClick r:id="rId8"/>
+              </a:rPr>
+              <a:t>Pluralsight Course on Asynchronous C# 5.0</a:t>
+            </a:r>
+            <a:endParaRPr lang="en-GB" u="sng" dirty="0"/>
+          </a:p>
+          <a:p>
+            <a:r>
+              <a:rPr lang="de-DE" dirty="0"/>
+              <a:t>Cliff Click – A Non-</a:t>
+            </a:r>
+            <a:r>
+              <a:rPr lang="de-DE" dirty="0" err="1"/>
+              <a:t>Blocking</a:t>
+            </a:r>
+            <a:r>
+              <a:rPr lang="de-DE" dirty="0"/>
+              <a:t> </a:t>
+            </a:r>
+            <a:r>
+              <a:rPr lang="de-DE" dirty="0" err="1"/>
+              <a:t>HashTable</a:t>
+            </a:r>
+            <a:br>
+              <a:rPr lang="de-DE" dirty="0"/>
+            </a:br>
+            <a:r>
+              <a:rPr lang="x-none" dirty="0">
+                <a:hlinkClick r:id="rId9"/>
+              </a:rPr>
+              <a:t>http://www.cliffc.org/blog/2007/03/26/non-blocking-hashtable/</a:t>
+            </a:r>
+            <a:br>
+              <a:rPr lang="de-DE" dirty="0"/>
+            </a:br>
+            <a:endParaRPr lang="de-DE" dirty="0"/>
+          </a:p>
+        </p:txBody>
+      </p:sp>
+      <p:sp>
+        <p:nvSpPr>
+          <p:cNvPr id="4" name="Date Placeholder 3"/>
+          <p:cNvSpPr>
+            <a:spLocks noGrp="1"/>
+          </p:cNvSpPr>
+          <p:nvPr>
+            <p:ph type="dt" sz="half" idx="10"/>
+          </p:nvPr>
+        </p:nvSpPr>
+        <p:spPr/>
+        <p:txBody>
+          <a:bodyPr/>
+          <a:lstStyle/>
+          <a:p>
+            <a:r>
+              <a:rPr lang="en-US"/>
+              <a:t>15.03.2017</a:t>
+            </a:r>
+          </a:p>
+        </p:txBody>
+      </p:sp>
+      <p:sp>
+        <p:nvSpPr>
+          <p:cNvPr id="5" name="Footer Placeholder 4"/>
+          <p:cNvSpPr>
+            <a:spLocks noGrp="1"/>
+          </p:cNvSpPr>
+          <p:nvPr>
+            <p:ph type="ftr" sz="quarter" idx="11"/>
+          </p:nvPr>
+        </p:nvSpPr>
+        <p:spPr/>
+        <p:txBody>
+          <a:bodyPr/>
+          <a:lstStyle/>
+          <a:p>
+            <a:r>
+              <a:rPr lang="en-US"/>
+              <a:t>.NET Threading im Detail</a:t>
+            </a:r>
+          </a:p>
+        </p:txBody>
+      </p:sp>
+      <p:sp>
+        <p:nvSpPr>
+          <p:cNvPr id="6" name="Slide Number Placeholder 5"/>
+          <p:cNvSpPr>
+            <a:spLocks noGrp="1"/>
+          </p:cNvSpPr>
+          <p:nvPr>
+            <p:ph type="sldNum" sz="quarter" idx="12"/>
+          </p:nvPr>
+        </p:nvSpPr>
+        <p:spPr/>
+        <p:txBody>
+          <a:bodyPr/>
+          <a:lstStyle/>
+          <a:p>
+            <a:fld id="{FF4FE05E-2642-448D-9FC5-15A41ACA4214}" type="slidenum">
+              <a:rPr lang="en-US" smtClean="0"/>
+              <a:t>66</a:t>
+            </a:fld>
+            <a:endParaRPr lang="en-US"/>
+          </a:p>
+        </p:txBody>
+      </p:sp>
+    </p:spTree>
+    <p:extLst>
+      <p:ext uri="{BB962C8B-B14F-4D97-AF65-F5344CB8AC3E}">
+        <p14:creationId xmlns:p14="http://schemas.microsoft.com/office/powerpoint/2010/main" val="1617267930"/>
+      </p:ext>
+    </p:extLst>
+  </p:cSld>
+  <p:clrMapOvr>
+    <a:masterClrMapping/>
+  </p:clrMapOvr>
+  <p:transition spd="med">
+    <p:cover/>
+  </p:transition>
+</p:sld>
+</file>
+
+<file path=ppt/slides/slide67.xml><?xml version="1.0" encoding="utf-8"?>
+<p:sld xmlns:a="http://schemas.openxmlformats.org/drawingml/2006/main" xmlns:r="http://schemas.openxmlformats.org/officeDocument/2006/relationships" xmlns:p="http://schemas.openxmlformats.org/presentationml/2006/main">
+  <p:cSld>
+    <p:spTree>
+      <p:nvGrpSpPr>
+        <p:cNvPr id="1" name=""/>
+        <p:cNvGrpSpPr/>
+        <p:nvPr/>
+      </p:nvGrpSpPr>
+      <p:grpSpPr>
+        <a:xfrm>
+          <a:off x="0" y="0"/>
+          <a:ext cx="0" cy="0"/>
+          <a:chOff x="0" y="0"/>
+          <a:chExt cx="0" cy="0"/>
+        </a:xfrm>
+      </p:grpSpPr>
+      <p:sp>
+        <p:nvSpPr>
           <p:cNvPr id="7" name="Title 6"/>
           <p:cNvSpPr>
             <a:spLocks noGrp="1"/>
@@ -33407,7 +36065,7 @@
           <a:p>
             <a:fld id="{FF4FE05E-2642-448D-9FC5-15A41ACA4214}" type="slidenum">
               <a:rPr lang="en-US" smtClean="0"/>
-              <a:t>65</a:t>
+              <a:t>67</a:t>
             </a:fld>
             <a:endParaRPr lang="en-US"/>
           </a:p>

</xml_diff>

<commit_message>
updated slides for June 2017 talk at .NET Developer Group Ingolstadt
</commit_message>
<xml_diff>
--- a/NET Threading im Detail.pptx
+++ b/NET Threading im Detail.pptx
@@ -181,6 +181,10 @@
 </p:presentation>
 </file>
 
+<file path=ppt/revisionInfo.xml><?xml version="1.0" encoding="utf-8"?>
+<p1510:revInfo xmlns:a="http://schemas.openxmlformats.org/drawingml/2006/main" xmlns:r="http://schemas.openxmlformats.org/officeDocument/2006/relationships" xmlns:p1510="http://schemas.microsoft.com/office/powerpoint/2015/10/main"/>
+</file>
+
 <file path=ppt/charts/chart1.xml><?xml version="1.0" encoding="utf-8"?>
 <c:chartSpace xmlns:c="http://schemas.openxmlformats.org/drawingml/2006/chart" xmlns:a="http://schemas.openxmlformats.org/drawingml/2006/main" xmlns:r="http://schemas.openxmlformats.org/officeDocument/2006/relationships" xmlns:c16r2="http://schemas.microsoft.com/office/drawing/2015/06/chart">
   <c:date1904 val="0"/>
@@ -251,7 +255,7 @@
               <a:cs typeface="+mn-cs"/>
             </a:defRPr>
           </a:pPr>
-          <a:endParaRPr lang="de-DE"/>
+          <a:endParaRPr lang="en-US"/>
         </a:p>
       </c:txPr>
     </c:title>
@@ -313,7 +317,7 @@
                     <a:cs typeface="+mn-cs"/>
                   </a:defRPr>
                 </a:pPr>
-                <a:endParaRPr lang="de-DE"/>
+                <a:endParaRPr lang="en-US"/>
               </a:p>
             </c:txPr>
             <c:dLblPos val="outEnd"/>
@@ -436,7 +440,7 @@
                     <a:cs typeface="+mn-cs"/>
                   </a:defRPr>
                 </a:pPr>
-                <a:endParaRPr lang="de-DE"/>
+                <a:endParaRPr lang="en-US"/>
               </a:p>
             </c:txPr>
             <c:dLblPos val="outEnd"/>
@@ -559,7 +563,7 @@
                     <a:cs typeface="+mn-cs"/>
                   </a:defRPr>
                 </a:pPr>
-                <a:endParaRPr lang="de-DE"/>
+                <a:endParaRPr lang="en-US"/>
               </a:p>
             </c:txPr>
             <c:dLblPos val="outEnd"/>
@@ -686,7 +690,7 @@
                 <a:cs typeface="+mn-cs"/>
               </a:defRPr>
             </a:pPr>
-            <a:endParaRPr lang="de-DE"/>
+            <a:endParaRPr lang="en-US"/>
           </a:p>
         </c:txPr>
         <c:crossAx val="501055880"/>
@@ -745,7 +749,7 @@
                 <a:cs typeface="+mn-cs"/>
               </a:defRPr>
             </a:pPr>
-            <a:endParaRPr lang="de-DE"/>
+            <a:endParaRPr lang="en-US"/>
           </a:p>
         </c:txPr>
         <c:crossAx val="501052272"/>
@@ -787,7 +791,7 @@
               <a:cs typeface="+mn-cs"/>
             </a:defRPr>
           </a:pPr>
-          <a:endParaRPr lang="de-DE"/>
+          <a:endParaRPr lang="en-US"/>
         </a:p>
       </c:txPr>
     </c:legend>
@@ -809,7 +813,7 @@
       <a:pPr>
         <a:defRPr/>
       </a:pPr>
-      <a:endParaRPr lang="de-DE"/>
+      <a:endParaRPr lang="en-US"/>
     </a:p>
   </c:txPr>
   <c:externalData r:id="rId3">
@@ -888,7 +892,7 @@
               <a:cs typeface="+mn-cs"/>
             </a:defRPr>
           </a:pPr>
-          <a:endParaRPr lang="de-DE"/>
+          <a:endParaRPr lang="en-US"/>
         </a:p>
       </c:txPr>
     </c:title>
@@ -950,7 +954,7 @@
                     <a:cs typeface="+mn-cs"/>
                   </a:defRPr>
                 </a:pPr>
-                <a:endParaRPr lang="de-DE"/>
+                <a:endParaRPr lang="en-US"/>
               </a:p>
             </c:txPr>
             <c:dLblPos val="outEnd"/>
@@ -1073,7 +1077,7 @@
                     <a:cs typeface="+mn-cs"/>
                   </a:defRPr>
                 </a:pPr>
-                <a:endParaRPr lang="de-DE"/>
+                <a:endParaRPr lang="en-US"/>
               </a:p>
             </c:txPr>
             <c:dLblPos val="outEnd"/>
@@ -1196,7 +1200,7 @@
                     <a:cs typeface="+mn-cs"/>
                   </a:defRPr>
                 </a:pPr>
-                <a:endParaRPr lang="de-DE"/>
+                <a:endParaRPr lang="en-US"/>
               </a:p>
             </c:txPr>
             <c:dLblPos val="outEnd"/>
@@ -1323,7 +1327,7 @@
                 <a:cs typeface="+mn-cs"/>
               </a:defRPr>
             </a:pPr>
-            <a:endParaRPr lang="de-DE"/>
+            <a:endParaRPr lang="en-US"/>
           </a:p>
         </c:txPr>
         <c:crossAx val="555098856"/>
@@ -1382,7 +1386,7 @@
                 <a:cs typeface="+mn-cs"/>
               </a:defRPr>
             </a:pPr>
-            <a:endParaRPr lang="de-DE"/>
+            <a:endParaRPr lang="en-US"/>
           </a:p>
         </c:txPr>
         <c:crossAx val="555102792"/>
@@ -1424,7 +1428,7 @@
               <a:cs typeface="+mn-cs"/>
             </a:defRPr>
           </a:pPr>
-          <a:endParaRPr lang="de-DE"/>
+          <a:endParaRPr lang="en-US"/>
         </a:p>
       </c:txPr>
     </c:legend>
@@ -1446,7 +1450,7 @@
       <a:pPr>
         <a:defRPr/>
       </a:pPr>
-      <a:endParaRPr lang="de-DE"/>
+      <a:endParaRPr lang="en-US"/>
     </a:p>
   </c:txPr>
   <c:externalData r:id="rId3">
@@ -2623,7 +2627,7 @@
           <a:p>
             <a:fld id="{31329841-37CA-41DE-9E66-2E01450F3727}" type="datetimeFigureOut">
               <a:rPr lang="en-US" smtClean="0"/>
-              <a:t>3/15/2017</a:t>
+              <a:t>6/12/2017</a:t>
             </a:fld>
             <a:endParaRPr lang="en-US"/>
           </a:p>
@@ -3019,7 +3023,7 @@
           <a:p>
             <a:r>
               <a:rPr lang="en-US"/>
-              <a:t>15.03.2017</a:t>
+              <a:t>12.06.2017</a:t>
             </a:r>
           </a:p>
         </p:txBody>
@@ -3192,7 +3196,7 @@
           <a:p>
             <a:r>
               <a:rPr lang="en-US"/>
-              <a:t>15.03.2017</a:t>
+              <a:t>12.06.2017</a:t>
             </a:r>
           </a:p>
         </p:txBody>
@@ -3442,7 +3446,7 @@
           <a:p>
             <a:r>
               <a:rPr lang="en-US"/>
-              <a:t>15.03.2017</a:t>
+              <a:t>12.06.2017</a:t>
             </a:r>
           </a:p>
         </p:txBody>
@@ -3683,7 +3687,7 @@
           <a:p>
             <a:r>
               <a:rPr lang="en-US"/>
-              <a:t>15.03.2017</a:t>
+              <a:t>12.06.2017</a:t>
             </a:r>
           </a:p>
         </p:txBody>
@@ -4059,7 +4063,7 @@
           <a:p>
             <a:r>
               <a:rPr lang="en-US"/>
-              <a:t>15.03.2017</a:t>
+              <a:t>12.06.2017</a:t>
             </a:r>
           </a:p>
         </p:txBody>
@@ -4188,7 +4192,7 @@
           <a:p>
             <a:r>
               <a:rPr lang="en-US"/>
-              <a:t>15.03.2017</a:t>
+              <a:t>12.06.2017</a:t>
             </a:r>
           </a:p>
         </p:txBody>
@@ -4288,7 +4292,7 @@
           <a:p>
             <a:r>
               <a:rPr lang="en-US"/>
-              <a:t>15.03.2017</a:t>
+              <a:t>12.06.2017</a:t>
             </a:r>
           </a:p>
         </p:txBody>
@@ -4571,7 +4575,7 @@
           <a:p>
             <a:r>
               <a:rPr lang="en-US"/>
-              <a:t>15.03.2017</a:t>
+              <a:t>12.06.2017</a:t>
             </a:r>
           </a:p>
         </p:txBody>
@@ -4831,7 +4835,7 @@
           <a:p>
             <a:r>
               <a:rPr lang="en-US"/>
-              <a:t>15.03.2017</a:t>
+              <a:t>12.06.2017</a:t>
             </a:r>
           </a:p>
         </p:txBody>
@@ -5047,7 +5051,7 @@
           <a:p>
             <a:r>
               <a:rPr lang="en-US"/>
-              <a:t>15.03.2017</a:t>
+              <a:t>12.06.2017</a:t>
             </a:r>
           </a:p>
         </p:txBody>
@@ -6035,25 +6039,14 @@
           <a:p>
             <a:r>
               <a:rPr lang="de-DE" dirty="0"/>
-              <a:t>.NET Developer Group Ulm</a:t>
+              <a:t>.NET Developer Group Ingolstadt</a:t>
             </a:r>
           </a:p>
           <a:p>
             <a:r>
               <a:rPr lang="de-DE" dirty="0"/>
-              <a:t>15.03.2017</a:t>
-            </a:r>
-          </a:p>
-          <a:p>
-            <a:r>
-              <a:rPr lang="de-DE" dirty="0" err="1"/>
-              <a:t>Artiso</a:t>
-            </a:r>
-            <a:r>
-              <a:rPr lang="de-DE" dirty="0"/>
-              <a:t> Solutions GmbH</a:t>
-            </a:r>
-            <a:endParaRPr lang="en-US" dirty="0"/>
+              <a:t>12.06.2017</a:t>
+            </a:r>
           </a:p>
         </p:txBody>
       </p:sp>
@@ -6074,7 +6067,7 @@
           <a:p>
             <a:r>
               <a:rPr lang="en-US"/>
-              <a:t>15.03.2017</a:t>
+              <a:t>12.06.2017</a:t>
             </a:r>
           </a:p>
         </p:txBody>
@@ -6281,7 +6274,7 @@
           <a:p>
             <a:r>
               <a:rPr lang="en-US"/>
-              <a:t>15.03.2017</a:t>
+              <a:t>12.06.2017</a:t>
             </a:r>
           </a:p>
         </p:txBody>
@@ -6689,7 +6682,7 @@
           <a:p>
             <a:r>
               <a:rPr lang="en-US"/>
-              <a:t>15.03.2017</a:t>
+              <a:t>12.06.2017</a:t>
             </a:r>
           </a:p>
         </p:txBody>
@@ -7105,7 +7098,7 @@
           <a:p>
             <a:r>
               <a:rPr lang="en-US"/>
-              <a:t>15.03.2017</a:t>
+              <a:t>12.06.2017</a:t>
             </a:r>
           </a:p>
         </p:txBody>
@@ -7255,7 +7248,7 @@
           <a:p>
             <a:r>
               <a:rPr lang="en-US"/>
-              <a:t>15.03.2017</a:t>
+              <a:t>12.06.2017</a:t>
             </a:r>
           </a:p>
         </p:txBody>
@@ -7377,7 +7370,7 @@
           <a:p>
             <a:r>
               <a:rPr lang="en-US"/>
-              <a:t>15.03.2017</a:t>
+              <a:t>12.06.2017</a:t>
             </a:r>
           </a:p>
         </p:txBody>
@@ -7662,7 +7655,7 @@
           <a:p>
             <a:r>
               <a:rPr lang="en-US"/>
-              <a:t>15.03.2017</a:t>
+              <a:t>12.06.2017</a:t>
             </a:r>
           </a:p>
         </p:txBody>
@@ -8007,7 +8000,7 @@
           <a:p>
             <a:r>
               <a:rPr lang="en-US"/>
-              <a:t>15.03.2017</a:t>
+              <a:t>12.06.2017</a:t>
             </a:r>
           </a:p>
         </p:txBody>
@@ -8388,7 +8381,7 @@
           <a:p>
             <a:r>
               <a:rPr lang="en-US"/>
-              <a:t>15.03.2017</a:t>
+              <a:t>12.06.2017</a:t>
             </a:r>
           </a:p>
         </p:txBody>
@@ -8806,7 +8799,7 @@
           <a:p>
             <a:r>
               <a:rPr lang="en-US"/>
-              <a:t>15.03.2017</a:t>
+              <a:t>12.06.2017</a:t>
             </a:r>
           </a:p>
         </p:txBody>
@@ -9309,7 +9302,7 @@
           <a:p>
             <a:r>
               <a:rPr lang="en-US"/>
-              <a:t>15.03.2017</a:t>
+              <a:t>12.06.2017</a:t>
             </a:r>
           </a:p>
         </p:txBody>
@@ -9783,7 +9776,7 @@
           <a:p>
             <a:r>
               <a:rPr lang="en-US"/>
-              <a:t>15.03.2017</a:t>
+              <a:t>12.06.2017</a:t>
             </a:r>
           </a:p>
         </p:txBody>
@@ -9905,7 +9898,7 @@
           <a:p>
             <a:r>
               <a:rPr lang="en-US"/>
-              <a:t>15.03.2017</a:t>
+              <a:t>12.06.2017</a:t>
             </a:r>
           </a:p>
         </p:txBody>
@@ -10286,7 +10279,7 @@
           <a:p>
             <a:r>
               <a:rPr lang="en-US"/>
-              <a:t>15.03.2017</a:t>
+              <a:t>12.06.2017</a:t>
             </a:r>
           </a:p>
         </p:txBody>
@@ -10631,7 +10624,7 @@
           <a:p>
             <a:r>
               <a:rPr lang="en-US"/>
-              <a:t>15.03.2017</a:t>
+              <a:t>12.06.2017</a:t>
             </a:r>
           </a:p>
         </p:txBody>
@@ -11126,7 +11119,7 @@
           <a:p>
             <a:r>
               <a:rPr lang="en-US"/>
-              <a:t>15.03.2017</a:t>
+              <a:t>12.06.2017</a:t>
             </a:r>
           </a:p>
         </p:txBody>
@@ -11586,7 +11579,7 @@
           <a:p>
             <a:r>
               <a:rPr lang="en-US"/>
-              <a:t>15.03.2017</a:t>
+              <a:t>12.06.2017</a:t>
             </a:r>
           </a:p>
         </p:txBody>
@@ -12013,7 +12006,7 @@
           <a:p>
             <a:r>
               <a:rPr lang="en-US"/>
-              <a:t>15.03.2017</a:t>
+              <a:t>12.06.2017</a:t>
             </a:r>
           </a:p>
         </p:txBody>
@@ -12420,7 +12413,7 @@
           <a:p>
             <a:r>
               <a:rPr lang="en-US"/>
-              <a:t>15.03.2017</a:t>
+              <a:t>12.06.2017</a:t>
             </a:r>
           </a:p>
         </p:txBody>
@@ -12939,7 +12932,7 @@
           <a:p>
             <a:r>
               <a:rPr lang="en-US"/>
-              <a:t>15.03.2017</a:t>
+              <a:t>12.06.2017</a:t>
             </a:r>
           </a:p>
         </p:txBody>
@@ -13080,7 +13073,7 @@
           <a:p>
             <a:r>
               <a:rPr lang="en-US"/>
-              <a:t>15.03.2017</a:t>
+              <a:t>12.06.2017</a:t>
             </a:r>
           </a:p>
         </p:txBody>
@@ -13250,7 +13243,7 @@
           <a:p>
             <a:r>
               <a:rPr lang="en-US"/>
-              <a:t>15.03.2017</a:t>
+              <a:t>12.06.2017</a:t>
             </a:r>
           </a:p>
         </p:txBody>
@@ -13369,7 +13362,7 @@
         <p:spPr/>
         <p:txBody>
           <a:bodyPr>
-            <a:normAutofit fontScale="85000" lnSpcReduction="10000"/>
+            <a:normAutofit fontScale="92500" lnSpcReduction="20000"/>
           </a:bodyPr>
           <a:lstStyle/>
           <a:p>
@@ -13381,19 +13374,20 @@
           <a:p>
             <a:r>
               <a:rPr lang="de-DE" dirty="0"/>
-              <a:t>Wissenschaftlicher Mitarbeiter an der OTH Regensburg</a:t>
-            </a:r>
+              <a:t>Autor der Open Source Library </a:t>
+            </a:r>
+            <a:r>
+              <a:rPr lang="de-DE" noProof="1">
+                <a:hlinkClick r:id="rId2"/>
+              </a:rPr>
+              <a:t>Light.GuardClauses</a:t>
+            </a:r>
+            <a:endParaRPr lang="de-DE" noProof="1"/>
           </a:p>
           <a:p>
             <a:r>
               <a:rPr lang="de-DE" dirty="0"/>
-              <a:t>Softwareentwickler bei virtNET</a:t>
-            </a:r>
-          </a:p>
-          <a:p>
-            <a:r>
-              <a:rPr lang="de-DE" dirty="0"/>
-              <a:t>Organisator der DNUG Regensburg</a:t>
+              <a:t>Organisator der .NET User Group Regensburg</a:t>
             </a:r>
           </a:p>
           <a:p>
@@ -13409,7 +13403,7 @@
             </a:r>
             <a:r>
               <a:rPr lang="de-DE" dirty="0">
-                <a:hlinkClick r:id="rId2"/>
+                <a:hlinkClick r:id="rId3"/>
               </a:rPr>
               <a:t>www.feo2x.com</a:t>
             </a:r>
@@ -13425,7 +13419,7 @@
             </a:r>
             <a:r>
               <a:rPr lang="de-DE" dirty="0">
-                <a:hlinkClick r:id="rId3"/>
+                <a:hlinkClick r:id="rId4"/>
               </a:rPr>
               <a:t>@feo2x</a:t>
             </a:r>
@@ -13441,7 +13435,7 @@
             </a:r>
             <a:r>
               <a:rPr lang="de-DE" dirty="0">
-                <a:hlinkClick r:id="rId4"/>
+                <a:hlinkClick r:id="rId5"/>
               </a:rPr>
               <a:t>www.youtube.com/c/kennypflug</a:t>
             </a:r>
@@ -13460,7 +13454,7 @@
           </p:nvPr>
         </p:nvPicPr>
         <p:blipFill>
-          <a:blip r:embed="rId5">
+          <a:blip r:embed="rId6">
             <a:extLst>
               <a:ext uri="{28A0092B-C50C-407E-A947-70E740481C1C}">
                 <a14:useLocalDpi xmlns:a14="http://schemas.microsoft.com/office/drawing/2010/main" val="0"/>
@@ -13495,7 +13489,7 @@
           <a:p>
             <a:r>
               <a:rPr lang="en-US"/>
-              <a:t>15.03.2017</a:t>
+              <a:t>12.06.2017</a:t>
             </a:r>
           </a:p>
         </p:txBody>
@@ -13777,7 +13771,7 @@
                                         <p:tgtEl>
                                           <p:spTgt spid="5">
                                             <p:txEl>
-                                              <p:pRg st="3" end="3"/>
+                                              <p:pRg st="4" end="4"/>
                                             </p:txEl>
                                           </p:spTgt>
                                         </p:tgtEl>
@@ -13795,7 +13789,7 @@
                                         <p:tgtEl>
                                           <p:spTgt spid="5">
                                             <p:txEl>
-                                              <p:pRg st="3" end="3"/>
+                                              <p:pRg st="4" end="4"/>
                                             </p:txEl>
                                           </p:spTgt>
                                         </p:tgtEl>
@@ -13932,67 +13926,6 @@
                       </p:childTnLst>
                     </p:cTn>
                   </p:par>
-                  <p:par>
-                    <p:cTn id="33" fill="hold">
-                      <p:stCondLst>
-                        <p:cond delay="indefinite"/>
-                      </p:stCondLst>
-                      <p:childTnLst>
-                        <p:par>
-                          <p:cTn id="34" fill="hold">
-                            <p:stCondLst>
-                              <p:cond delay="0"/>
-                            </p:stCondLst>
-                            <p:childTnLst>
-                              <p:par>
-                                <p:cTn id="35" presetID="10" presetClass="entr" presetSubtype="0" fill="hold" grpId="0" nodeType="clickEffect">
-                                  <p:stCondLst>
-                                    <p:cond delay="0"/>
-                                  </p:stCondLst>
-                                  <p:childTnLst>
-                                    <p:set>
-                                      <p:cBhvr>
-                                        <p:cTn id="36" dur="1" fill="hold">
-                                          <p:stCondLst>
-                                            <p:cond delay="0"/>
-                                          </p:stCondLst>
-                                        </p:cTn>
-                                        <p:tgtEl>
-                                          <p:spTgt spid="5">
-                                            <p:txEl>
-                                              <p:pRg st="7" end="7"/>
-                                            </p:txEl>
-                                          </p:spTgt>
-                                        </p:tgtEl>
-                                        <p:attrNameLst>
-                                          <p:attrName>style.visibility</p:attrName>
-                                        </p:attrNameLst>
-                                      </p:cBhvr>
-                                      <p:to>
-                                        <p:strVal val="visible"/>
-                                      </p:to>
-                                    </p:set>
-                                    <p:animEffect transition="in" filter="fade">
-                                      <p:cBhvr>
-                                        <p:cTn id="37" dur="500"/>
-                                        <p:tgtEl>
-                                          <p:spTgt spid="5">
-                                            <p:txEl>
-                                              <p:pRg st="7" end="7"/>
-                                            </p:txEl>
-                                          </p:spTgt>
-                                        </p:tgtEl>
-                                      </p:cBhvr>
-                                    </p:animEffect>
-                                  </p:childTnLst>
-                                </p:cTn>
-                              </p:par>
-                            </p:childTnLst>
-                          </p:cTn>
-                        </p:par>
-                      </p:childTnLst>
-                    </p:cTn>
-                  </p:par>
                 </p:childTnLst>
               </p:cTn>
               <p:prevCondLst>
@@ -14109,7 +14042,7 @@
           <a:p>
             <a:r>
               <a:rPr lang="en-US"/>
-              <a:t>15.03.2017</a:t>
+              <a:t>12.06.2017</a:t>
             </a:r>
           </a:p>
         </p:txBody>
@@ -14233,7 +14166,7 @@
           <a:p>
             <a:r>
               <a:rPr lang="de-DE" dirty="0"/>
-              <a:t>Eine Abstraktion über eine asynchrone Operation</a:t>
+              <a:t>Eine Abstraktion über eine asynchrone Operation (Berechnung auf anderem Thread oder IO Operation)</a:t>
             </a:r>
           </a:p>
           <a:p>
@@ -14298,7 +14231,7 @@
           <a:p>
             <a:r>
               <a:rPr lang="en-US"/>
-              <a:t>15.03.2017</a:t>
+              <a:t>12.06.2017</a:t>
             </a:r>
           </a:p>
         </p:txBody>
@@ -14892,7 +14825,7 @@
           <a:p>
             <a:r>
               <a:rPr lang="en-US"/>
-              <a:t>15.03.2017</a:t>
+              <a:t>12.06.2017</a:t>
             </a:r>
           </a:p>
         </p:txBody>
@@ -15042,7 +14975,7 @@
           <a:p>
             <a:r>
               <a:rPr lang="en-US"/>
-              <a:t>15.03.2017</a:t>
+              <a:t>12.06.2017</a:t>
             </a:r>
           </a:p>
         </p:txBody>
@@ -15176,7 +15109,7 @@
           <a:p>
             <a:r>
               <a:rPr lang="en-US"/>
-              <a:t>15.03.2017</a:t>
+              <a:t>12.06.2017</a:t>
             </a:r>
           </a:p>
         </p:txBody>
@@ -15353,7 +15286,7 @@
           <a:p>
             <a:r>
               <a:rPr lang="en-US"/>
-              <a:t>15.03.2017</a:t>
+              <a:t>12.06.2017</a:t>
             </a:r>
           </a:p>
         </p:txBody>
@@ -15778,7 +15711,7 @@
           <a:p>
             <a:r>
               <a:rPr lang="en-US"/>
-              <a:t>15.03.2017</a:t>
+              <a:t>12.06.2017</a:t>
             </a:r>
           </a:p>
         </p:txBody>
@@ -16349,7 +16282,7 @@
           <a:p>
             <a:r>
               <a:rPr lang="en-US"/>
-              <a:t>15.03.2017</a:t>
+              <a:t>12.06.2017</a:t>
             </a:r>
           </a:p>
         </p:txBody>
@@ -17264,7 +17197,7 @@
           <a:p>
             <a:r>
               <a:rPr lang="en-US"/>
-              <a:t>15.03.2017</a:t>
+              <a:t>12.06.2017</a:t>
             </a:r>
           </a:p>
         </p:txBody>
@@ -18209,7 +18142,7 @@
           <a:p>
             <a:r>
               <a:rPr lang="en-US"/>
-              <a:t>15.03.2017</a:t>
+              <a:t>12.06.2017</a:t>
             </a:r>
           </a:p>
         </p:txBody>
@@ -19157,7 +19090,7 @@
           <a:p>
             <a:r>
               <a:rPr lang="en-US"/>
-              <a:t>15.03.2017</a:t>
+              <a:t>12.06.2017</a:t>
             </a:r>
           </a:p>
         </p:txBody>
@@ -19256,10 +19189,9 @@
           <a:lstStyle/>
           <a:p>
             <a:r>
-              <a:rPr lang="de-DE" dirty="0" err="1"/>
+              <a:rPr lang="de-DE" noProof="1"/>
               <a:t>SynchronizationContext</a:t>
             </a:r>
-            <a:endParaRPr lang="en-US" dirty="0"/>
           </a:p>
         </p:txBody>
       </p:sp>
@@ -19276,7 +19208,7 @@
         <p:spPr/>
         <p:txBody>
           <a:bodyPr>
-            <a:normAutofit/>
+            <a:normAutofit fontScale="92500" lnSpcReduction="20000"/>
           </a:bodyPr>
           <a:lstStyle/>
           <a:p>
@@ -19313,7 +19245,39 @@
           <a:p>
             <a:r>
               <a:rPr lang="de-DE" dirty="0"/>
-              <a:t>Dieser wird üblicherweise von UI Frameworks initialisiert (aber auch von ASP.NET).</a:t>
+              <a:t>Dieser wird üblicherweise von UI Frameworks initialisiert und verknüpft bspw. in WPF den </a:t>
+            </a:r>
+            <a:r>
+              <a:rPr lang="de-DE" sz="2200" noProof="1">
+                <a:solidFill>
+                  <a:srgbClr val="2D91AF"/>
+                </a:solidFill>
+                <a:latin typeface="Consolas" panose="020B0609020204030204" pitchFamily="49" charset="0"/>
+              </a:rPr>
+              <a:t>DispatcherSynchronizationContext</a:t>
+            </a:r>
+            <a:r>
+              <a:rPr lang="de-DE" dirty="0"/>
+              <a:t> mit dem WPF </a:t>
+            </a:r>
+            <a:r>
+              <a:rPr lang="de-DE" dirty="0">
+                <a:solidFill>
+                  <a:srgbClr val="2D91AF"/>
+                </a:solidFill>
+                <a:latin typeface="Consolas" panose="020B0609020204030204" pitchFamily="49" charset="0"/>
+              </a:rPr>
+              <a:t>Dispatcher</a:t>
+            </a:r>
+            <a:r>
+              <a:rPr lang="de-DE" dirty="0"/>
+              <a:t>.</a:t>
+            </a:r>
+          </a:p>
+          <a:p>
+            <a:r>
+              <a:rPr lang="de-DE" dirty="0"/>
+              <a:t>Aber auch ASP.NET installiert beim Start einen eigenen Kontext, der den Thread Pool nutzt.</a:t>
             </a:r>
             <a:endParaRPr lang="en-US" dirty="0"/>
           </a:p>
@@ -19336,7 +19300,7 @@
           <a:p>
             <a:r>
               <a:rPr lang="en-US"/>
-              <a:t>15.03.2017</a:t>
+              <a:t>12.06.2017</a:t>
             </a:r>
           </a:p>
         </p:txBody>
@@ -19558,6 +19522,67 @@
                       </p:childTnLst>
                     </p:cTn>
                   </p:par>
+                  <p:par>
+                    <p:cTn id="13" fill="hold">
+                      <p:stCondLst>
+                        <p:cond delay="indefinite"/>
+                      </p:stCondLst>
+                      <p:childTnLst>
+                        <p:par>
+                          <p:cTn id="14" fill="hold">
+                            <p:stCondLst>
+                              <p:cond delay="0"/>
+                            </p:stCondLst>
+                            <p:childTnLst>
+                              <p:par>
+                                <p:cTn id="15" presetID="10" presetClass="entr" presetSubtype="0" fill="hold" grpId="0" nodeType="clickEffect">
+                                  <p:stCondLst>
+                                    <p:cond delay="0"/>
+                                  </p:stCondLst>
+                                  <p:childTnLst>
+                                    <p:set>
+                                      <p:cBhvr>
+                                        <p:cTn id="16" dur="1" fill="hold">
+                                          <p:stCondLst>
+                                            <p:cond delay="0"/>
+                                          </p:stCondLst>
+                                        </p:cTn>
+                                        <p:tgtEl>
+                                          <p:spTgt spid="3">
+                                            <p:txEl>
+                                              <p:pRg st="2" end="2"/>
+                                            </p:txEl>
+                                          </p:spTgt>
+                                        </p:tgtEl>
+                                        <p:attrNameLst>
+                                          <p:attrName>style.visibility</p:attrName>
+                                        </p:attrNameLst>
+                                      </p:cBhvr>
+                                      <p:to>
+                                        <p:strVal val="visible"/>
+                                      </p:to>
+                                    </p:set>
+                                    <p:animEffect transition="in" filter="fade">
+                                      <p:cBhvr>
+                                        <p:cTn id="17" dur="500"/>
+                                        <p:tgtEl>
+                                          <p:spTgt spid="3">
+                                            <p:txEl>
+                                              <p:pRg st="2" end="2"/>
+                                            </p:txEl>
+                                          </p:spTgt>
+                                        </p:tgtEl>
+                                      </p:cBhvr>
+                                    </p:animEffect>
+                                  </p:childTnLst>
+                                </p:cTn>
+                              </p:par>
+                            </p:childTnLst>
+                          </p:cTn>
+                        </p:par>
+                      </p:childTnLst>
+                    </p:cTn>
+                  </p:par>
                 </p:childTnLst>
               </p:cTn>
               <p:prevCondLst>
@@ -19661,7 +19686,7 @@
           <a:p>
             <a:r>
               <a:rPr lang="en-US"/>
-              <a:t>15.03.2017</a:t>
+              <a:t>12.06.2017</a:t>
             </a:r>
           </a:p>
         </p:txBody>
@@ -20193,7 +20218,7 @@
           <a:p>
             <a:r>
               <a:rPr lang="en-US"/>
-              <a:t>15.03.2017</a:t>
+              <a:t>12.06.2017</a:t>
             </a:r>
           </a:p>
         </p:txBody>
@@ -21050,7 +21075,7 @@
           <a:p>
             <a:r>
               <a:rPr lang="en-US"/>
-              <a:t>15.03.2017</a:t>
+              <a:t>12.06.2017</a:t>
             </a:r>
           </a:p>
         </p:txBody>
@@ -21924,7 +21949,7 @@
           <a:p>
             <a:r>
               <a:rPr lang="en-US"/>
-              <a:t>15.03.2017</a:t>
+              <a:t>12.06.2017</a:t>
             </a:r>
           </a:p>
         </p:txBody>
@@ -22437,7 +22462,7 @@
           <a:p>
             <a:r>
               <a:rPr lang="en-US"/>
-              <a:t>15.03.2017</a:t>
+              <a:t>12.06.2017</a:t>
             </a:r>
           </a:p>
         </p:txBody>
@@ -22581,7 +22606,7 @@
           <a:p>
             <a:r>
               <a:rPr lang="en-US"/>
-              <a:t>15.03.2017</a:t>
+              <a:t>12.06.2017</a:t>
             </a:r>
           </a:p>
         </p:txBody>
@@ -22893,7 +22918,7 @@
           <a:p>
             <a:r>
               <a:rPr lang="en-US"/>
-              <a:t>15.03.2017</a:t>
+              <a:t>12.06.2017</a:t>
             </a:r>
           </a:p>
         </p:txBody>
@@ -23404,7 +23429,7 @@
           <a:p>
             <a:r>
               <a:rPr lang="en-US"/>
-              <a:t>15.03.2017</a:t>
+              <a:t>12.06.2017</a:t>
             </a:r>
           </a:p>
         </p:txBody>
@@ -23886,7 +23911,7 @@
           <a:p>
             <a:r>
               <a:rPr lang="en-US"/>
-              <a:t>15.03.2017</a:t>
+              <a:t>12.06.2017</a:t>
             </a:r>
           </a:p>
         </p:txBody>
@@ -24023,7 +24048,7 @@
           <a:p>
             <a:r>
               <a:rPr lang="de-DE" dirty="0"/>
-              <a:t>Threads wurden eingeführt, um parallel laufende Software schnell reagierend und robuster zu machen.</a:t>
+              <a:t>Threads wurden eingeführt, um Software robuster zu machen und (quasi-)parallel ablaufen zu lassen.</a:t>
             </a:r>
           </a:p>
           <a:p>
@@ -24052,7 +24077,7 @@
           <a:p>
             <a:r>
               <a:rPr lang="en-US"/>
-              <a:t>15.03.2017</a:t>
+              <a:t>12.06.2017</a:t>
             </a:r>
           </a:p>
         </p:txBody>
@@ -24450,7 +24475,7 @@
           <a:p>
             <a:r>
               <a:rPr lang="en-US"/>
-              <a:t>15.03.2017</a:t>
+              <a:t>12.06.2017</a:t>
             </a:r>
           </a:p>
         </p:txBody>
@@ -24580,7 +24605,7 @@
           <a:p>
             <a:r>
               <a:rPr lang="en-US"/>
-              <a:t>15.03.2017</a:t>
+              <a:t>12.06.2017</a:t>
             </a:r>
           </a:p>
         </p:txBody>
@@ -25458,7 +25483,7 @@
           <a:p>
             <a:r>
               <a:rPr lang="en-US"/>
-              <a:t>15.03.2017</a:t>
+              <a:t>12.06.2017</a:t>
             </a:r>
           </a:p>
         </p:txBody>
@@ -26374,7 +26399,7 @@
           <a:p>
             <a:r>
               <a:rPr lang="en-US"/>
-              <a:t>15.03.2017</a:t>
+              <a:t>12.06.2017</a:t>
             </a:r>
           </a:p>
         </p:txBody>
@@ -27326,7 +27351,7 @@
           <a:p>
             <a:r>
               <a:rPr lang="en-US"/>
-              <a:t>15.03.2017</a:t>
+              <a:t>12.06.2017</a:t>
             </a:r>
           </a:p>
         </p:txBody>
@@ -28321,7 +28346,7 @@
           <a:p>
             <a:r>
               <a:rPr lang="en-US"/>
-              <a:t>15.03.2017</a:t>
+              <a:t>12.06.2017</a:t>
             </a:r>
           </a:p>
         </p:txBody>
@@ -29369,7 +29394,7 @@
           <a:p>
             <a:r>
               <a:rPr lang="en-US"/>
-              <a:t>15.03.2017</a:t>
+              <a:t>12.06.2017</a:t>
             </a:r>
           </a:p>
         </p:txBody>
@@ -30418,7 +30443,7 @@
           <a:p>
             <a:r>
               <a:rPr lang="en-US"/>
-              <a:t>15.03.2017</a:t>
+              <a:t>12.06.2017</a:t>
             </a:r>
           </a:p>
         </p:txBody>
@@ -31467,7 +31492,7 @@
           <a:p>
             <a:r>
               <a:rPr lang="en-US"/>
-              <a:t>15.03.2017</a:t>
+              <a:t>12.06.2017</a:t>
             </a:r>
           </a:p>
         </p:txBody>
@@ -32460,7 +32485,7 @@
           <a:p>
             <a:r>
               <a:rPr lang="en-US"/>
-              <a:t>15.03.2017</a:t>
+              <a:t>12.06.2017</a:t>
             </a:r>
           </a:p>
         </p:txBody>
@@ -33627,7 +33652,7 @@
           <a:p>
             <a:r>
               <a:rPr lang="en-US"/>
-              <a:t>15.03.2017</a:t>
+              <a:t>12.06.2017</a:t>
             </a:r>
           </a:p>
         </p:txBody>
@@ -33757,7 +33782,7 @@
           <a:p>
             <a:r>
               <a:rPr lang="en-US"/>
-              <a:t>15.03.2017</a:t>
+              <a:t>12.06.2017</a:t>
             </a:r>
           </a:p>
         </p:txBody>
@@ -34871,7 +34896,7 @@
           <a:p>
             <a:r>
               <a:rPr lang="en-US"/>
-              <a:t>15.03.2017</a:t>
+              <a:t>12.06.2017</a:t>
             </a:r>
           </a:p>
         </p:txBody>
@@ -35019,7 +35044,7 @@
           <a:p>
             <a:r>
               <a:rPr lang="en-US"/>
-              <a:t>15.03.2017</a:t>
+              <a:t>12.06.2017</a:t>
             </a:r>
           </a:p>
         </p:txBody>
@@ -35167,7 +35192,7 @@
           <a:p>
             <a:r>
               <a:rPr lang="en-US"/>
-              <a:t>15.03.2017</a:t>
+              <a:t>12.06.2017</a:t>
             </a:r>
           </a:p>
         </p:txBody>
@@ -35355,7 +35380,7 @@
           <a:p>
             <a:r>
               <a:rPr lang="en-US"/>
-              <a:t>15.03.2017</a:t>
+              <a:t>12.06.2017</a:t>
             </a:r>
           </a:p>
         </p:txBody>
@@ -35588,7 +35613,7 @@
           <a:p>
             <a:r>
               <a:rPr lang="en-US"/>
-              <a:t>15.03.2017</a:t>
+              <a:t>12.06.2017</a:t>
             </a:r>
           </a:p>
         </p:txBody>
@@ -35871,7 +35896,7 @@
           <a:p>
             <a:r>
               <a:rPr lang="en-US"/>
-              <a:t>15.03.2017</a:t>
+              <a:t>12.06.2017</a:t>
             </a:r>
           </a:p>
         </p:txBody>
@@ -36021,7 +36046,7 @@
           <a:p>
             <a:r>
               <a:rPr lang="en-US"/>
-              <a:t>15.03.2017</a:t>
+              <a:t>12.06.2017</a:t>
             </a:r>
           </a:p>
         </p:txBody>
@@ -36167,7 +36192,7 @@
           <a:p>
             <a:r>
               <a:rPr lang="en-US"/>
-              <a:t>15.03.2017</a:t>
+              <a:t>12.06.2017</a:t>
             </a:r>
           </a:p>
         </p:txBody>
@@ -36339,7 +36364,7 @@
           <a:p>
             <a:r>
               <a:rPr lang="en-US"/>
-              <a:t>15.03.2017</a:t>
+              <a:t>12.06.2017</a:t>
             </a:r>
           </a:p>
         </p:txBody>
@@ -36481,7 +36506,7 @@
           <a:p>
             <a:r>
               <a:rPr lang="en-US"/>
-              <a:t>15.03.2017</a:t>
+              <a:t>12.06.2017</a:t>
             </a:r>
           </a:p>
         </p:txBody>

</xml_diff>